<commit_message>
keynote didn't convert cleanly so had to make some minor updates to the pptx version
</commit_message>
<xml_diff>
--- a/slides/4RulesOfSimpleDesign.pptx
+++ b/slides/4RulesOfSimpleDesign.pptx
@@ -1,13 +1,13 @@
 
 <file path=ppt/presentation.xml><?xml version="1.0" encoding="utf-8"?>
-<p:presentation xmlns:a="http://schemas.openxmlformats.org/drawingml/2006/main" xmlns:r="http://schemas.openxmlformats.org/officeDocument/2006/relationships" xmlns:p="http://schemas.openxmlformats.org/presentationml/2006/main" serverZoom="100000" compatMode="1" strictFirstAndLastChars="0" saveSubsetFonts="1" autoCompressPictures="0">
+<p:presentation xmlns:a="http://schemas.openxmlformats.org/drawingml/2006/main" xmlns:r="http://schemas.openxmlformats.org/officeDocument/2006/relationships" xmlns:p="http://schemas.openxmlformats.org/presentationml/2006/main" serverZoom="100000" strictFirstAndLastChars="0" saveSubsetFonts="1" autoCompressPictures="0">
   <p:sldMasterIdLst>
     <p:sldMasterId id="2147483648" r:id="rId1"/>
     <p:sldMasterId id="2147483649" r:id="rId2"/>
     <p:sldMasterId id="2147483650" r:id="rId3"/>
   </p:sldMasterIdLst>
   <p:notesMasterIdLst>
-    <p:notesMasterId r:id="rId54"/>
+    <p:notesMasterId r:id="rId53"/>
   </p:notesMasterIdLst>
   <p:sldIdLst>
     <p:sldId id="256" r:id="rId4"/>
@@ -42,24 +42,23 @@
     <p:sldId id="285" r:id="rId33"/>
     <p:sldId id="286" r:id="rId34"/>
     <p:sldId id="287" r:id="rId35"/>
-    <p:sldId id="288" r:id="rId36"/>
+    <p:sldId id="306" r:id="rId36"/>
     <p:sldId id="289" r:id="rId37"/>
-    <p:sldId id="290" r:id="rId38"/>
-    <p:sldId id="291" r:id="rId39"/>
-    <p:sldId id="292" r:id="rId40"/>
-    <p:sldId id="293" r:id="rId41"/>
-    <p:sldId id="294" r:id="rId42"/>
-    <p:sldId id="295" r:id="rId43"/>
-    <p:sldId id="296" r:id="rId44"/>
-    <p:sldId id="297" r:id="rId45"/>
-    <p:sldId id="298" r:id="rId46"/>
-    <p:sldId id="299" r:id="rId47"/>
-    <p:sldId id="300" r:id="rId48"/>
-    <p:sldId id="301" r:id="rId49"/>
-    <p:sldId id="302" r:id="rId50"/>
-    <p:sldId id="303" r:id="rId51"/>
-    <p:sldId id="304" r:id="rId52"/>
-    <p:sldId id="305" r:id="rId53"/>
+    <p:sldId id="307" r:id="rId38"/>
+    <p:sldId id="292" r:id="rId39"/>
+    <p:sldId id="293" r:id="rId40"/>
+    <p:sldId id="294" r:id="rId41"/>
+    <p:sldId id="295" r:id="rId42"/>
+    <p:sldId id="296" r:id="rId43"/>
+    <p:sldId id="297" r:id="rId44"/>
+    <p:sldId id="298" r:id="rId45"/>
+    <p:sldId id="299" r:id="rId46"/>
+    <p:sldId id="300" r:id="rId47"/>
+    <p:sldId id="301" r:id="rId48"/>
+    <p:sldId id="302" r:id="rId49"/>
+    <p:sldId id="303" r:id="rId50"/>
+    <p:sldId id="304" r:id="rId51"/>
+    <p:sldId id="305" r:id="rId52"/>
   </p:sldIdLst>
   <p:sldSz cx="9144000" cy="6858000" type="screen4x3"/>
   <p:notesSz cx="6858000" cy="9144000"/>
@@ -245,7 +244,7 @@
         <p:nvSpPr>
           <p:cNvPr id="4097" name="Rectangle 1"/>
           <p:cNvSpPr>
-            <a:spLocks/>
+            <a:spLocks noGrp="1" noRot="1" noChangeAspect="1"/>
           </p:cNvSpPr>
           <p:nvPr>
             <p:ph type="sldImg" idx="2"/>
@@ -304,7 +303,7 @@
         <p:nvSpPr>
           <p:cNvPr id="4098" name="Rectangle 2"/>
           <p:cNvSpPr>
-            <a:spLocks/>
+            <a:spLocks noGrp="1"/>
           </p:cNvSpPr>
           <p:nvPr>
             <p:ph type="body" sz="quarter" idx="3"/>
@@ -586,7 +585,7 @@
         <p:nvSpPr>
           <p:cNvPr id="6145" name="Rectangle 1"/>
           <p:cNvSpPr>
-            <a:spLocks noChangeArrowheads="1"/>
+            <a:spLocks noGrp="1" noRot="1" noChangeAspect="1" noChangeArrowheads="1"/>
           </p:cNvSpPr>
           <p:nvPr>
             <p:ph type="sldImg"/>
@@ -598,7 +597,7 @@
         <p:nvSpPr>
           <p:cNvPr id="6146" name="Rectangle 2"/>
           <p:cNvSpPr>
-            <a:spLocks noChangeArrowheads="1"/>
+            <a:spLocks noGrp="1" noChangeArrowheads="1"/>
           </p:cNvSpPr>
           <p:nvPr>
             <p:ph type="body" idx="1"/>
@@ -737,7 +736,7 @@
         <p:nvSpPr>
           <p:cNvPr id="8193" name="Rectangle 1"/>
           <p:cNvSpPr>
-            <a:spLocks noChangeArrowheads="1"/>
+            <a:spLocks noGrp="1" noRot="1" noChangeAspect="1" noChangeArrowheads="1"/>
           </p:cNvSpPr>
           <p:nvPr>
             <p:ph type="sldImg"/>
@@ -749,7 +748,7 @@
         <p:nvSpPr>
           <p:cNvPr id="8194" name="Rectangle 2"/>
           <p:cNvSpPr>
-            <a:spLocks noChangeArrowheads="1"/>
+            <a:spLocks noGrp="1" noChangeArrowheads="1"/>
           </p:cNvSpPr>
           <p:nvPr>
             <p:ph type="body" idx="1"/>
@@ -859,7 +858,7 @@
         <p:nvSpPr>
           <p:cNvPr id="14337" name="Rectangle 1"/>
           <p:cNvSpPr>
-            <a:spLocks noChangeArrowheads="1"/>
+            <a:spLocks noGrp="1" noRot="1" noChangeAspect="1" noChangeArrowheads="1"/>
           </p:cNvSpPr>
           <p:nvPr>
             <p:ph type="sldImg"/>
@@ -871,7 +870,7 @@
         <p:nvSpPr>
           <p:cNvPr id="14338" name="Rectangle 2"/>
           <p:cNvSpPr>
-            <a:spLocks noChangeArrowheads="1"/>
+            <a:spLocks noGrp="1" noChangeArrowheads="1"/>
           </p:cNvSpPr>
           <p:nvPr>
             <p:ph type="body" idx="1"/>
@@ -934,7 +933,7 @@
         <p:nvSpPr>
           <p:cNvPr id="16385" name="Rectangle 1"/>
           <p:cNvSpPr>
-            <a:spLocks noChangeArrowheads="1"/>
+            <a:spLocks noGrp="1" noRot="1" noChangeAspect="1" noChangeArrowheads="1"/>
           </p:cNvSpPr>
           <p:nvPr>
             <p:ph type="sldImg"/>
@@ -946,7 +945,7 @@
         <p:nvSpPr>
           <p:cNvPr id="16386" name="Rectangle 2"/>
           <p:cNvSpPr>
-            <a:spLocks noChangeArrowheads="1"/>
+            <a:spLocks noGrp="1" noChangeArrowheads="1"/>
           </p:cNvSpPr>
           <p:nvPr>
             <p:ph type="body" idx="1"/>
@@ -1009,7 +1008,7 @@
         <p:nvSpPr>
           <p:cNvPr id="54273" name="Rectangle 1"/>
           <p:cNvSpPr>
-            <a:spLocks noChangeArrowheads="1"/>
+            <a:spLocks noGrp="1" noRot="1" noChangeAspect="1" noChangeArrowheads="1"/>
           </p:cNvSpPr>
           <p:nvPr>
             <p:ph type="sldImg"/>
@@ -1021,7 +1020,7 @@
         <p:nvSpPr>
           <p:cNvPr id="54274" name="Rectangle 2"/>
           <p:cNvSpPr>
-            <a:spLocks noChangeArrowheads="1"/>
+            <a:spLocks noGrp="1" noChangeArrowheads="1"/>
           </p:cNvSpPr>
           <p:nvPr>
             <p:ph type="body" idx="1"/>
@@ -1084,7 +1083,7 @@
         <p:nvSpPr>
           <p:cNvPr id="59393" name="Rectangle 1"/>
           <p:cNvSpPr>
-            <a:spLocks noChangeArrowheads="1"/>
+            <a:spLocks noGrp="1" noRot="1" noChangeAspect="1" noChangeArrowheads="1"/>
           </p:cNvSpPr>
           <p:nvPr>
             <p:ph type="sldImg"/>
@@ -1096,7 +1095,7 @@
         <p:nvSpPr>
           <p:cNvPr id="59394" name="Rectangle 2"/>
           <p:cNvSpPr>
-            <a:spLocks noChangeArrowheads="1"/>
+            <a:spLocks noGrp="1" noChangeArrowheads="1"/>
           </p:cNvSpPr>
           <p:nvPr>
             <p:ph type="body" idx="1"/>
@@ -1159,7 +1158,7 @@
         <p:nvSpPr>
           <p:cNvPr id="61441" name="Rectangle 1"/>
           <p:cNvSpPr>
-            <a:spLocks noChangeArrowheads="1"/>
+            <a:spLocks noGrp="1" noRot="1" noChangeAspect="1" noChangeArrowheads="1"/>
           </p:cNvSpPr>
           <p:nvPr>
             <p:ph type="sldImg"/>
@@ -1171,7 +1170,7 @@
         <p:nvSpPr>
           <p:cNvPr id="61442" name="Rectangle 2"/>
           <p:cNvSpPr>
-            <a:spLocks noChangeArrowheads="1"/>
+            <a:spLocks noGrp="1" noChangeArrowheads="1"/>
           </p:cNvSpPr>
           <p:nvPr>
             <p:ph type="body" idx="1"/>
@@ -1234,7 +1233,7 @@
         <p:nvSpPr>
           <p:cNvPr id="63489" name="Rectangle 1"/>
           <p:cNvSpPr>
-            <a:spLocks noChangeArrowheads="1"/>
+            <a:spLocks noGrp="1" noRot="1" noChangeAspect="1" noChangeArrowheads="1"/>
           </p:cNvSpPr>
           <p:nvPr>
             <p:ph type="sldImg"/>
@@ -1246,7 +1245,7 @@
         <p:nvSpPr>
           <p:cNvPr id="63490" name="Rectangle 2"/>
           <p:cNvSpPr>
-            <a:spLocks noChangeArrowheads="1"/>
+            <a:spLocks noGrp="1" noChangeArrowheads="1"/>
           </p:cNvSpPr>
           <p:nvPr>
             <p:ph type="body" idx="1"/>
@@ -7169,7 +7168,7 @@
         <p:nvSpPr>
           <p:cNvPr id="1026" name="Rectangle 2"/>
           <p:cNvSpPr>
-            <a:spLocks/>
+            <a:spLocks noGrp="1"/>
           </p:cNvSpPr>
           <p:nvPr>
             <p:ph type="sldNum" sz="quarter" idx="2"/>
@@ -7386,7 +7385,7 @@
         <p:nvSpPr>
           <p:cNvPr id="1029" name="Rectangle 5"/>
           <p:cNvSpPr>
-            <a:spLocks/>
+            <a:spLocks noGrp="1"/>
           </p:cNvSpPr>
           <p:nvPr>
             <p:ph type="body" idx="1"/>
@@ -8366,7 +8365,7 @@
         <p:nvSpPr>
           <p:cNvPr id="2051" name="Rectangle 3"/>
           <p:cNvSpPr>
-            <a:spLocks/>
+            <a:spLocks noGrp="1"/>
           </p:cNvSpPr>
           <p:nvPr>
             <p:ph type="title"/>
@@ -8442,7 +8441,7 @@
         <p:nvSpPr>
           <p:cNvPr id="2052" name="Rectangle 4"/>
           <p:cNvSpPr>
-            <a:spLocks/>
+            <a:spLocks noGrp="1"/>
           </p:cNvSpPr>
           <p:nvPr>
             <p:ph type="body" idx="1"/>
@@ -8554,7 +8553,7 @@
         <p:nvSpPr>
           <p:cNvPr id="2053" name="Rectangle 5"/>
           <p:cNvSpPr>
-            <a:spLocks/>
+            <a:spLocks noGrp="1"/>
           </p:cNvSpPr>
           <p:nvPr>
             <p:ph type="sldNum" sz="quarter" idx="2"/>
@@ -9442,7 +9441,7 @@
         <p:nvSpPr>
           <p:cNvPr id="3075" name="Rectangle 3"/>
           <p:cNvSpPr>
-            <a:spLocks/>
+            <a:spLocks noGrp="1"/>
           </p:cNvSpPr>
           <p:nvPr>
             <p:ph type="title"/>
@@ -9518,7 +9517,7 @@
         <p:nvSpPr>
           <p:cNvPr id="3076" name="Rectangle 4"/>
           <p:cNvSpPr>
-            <a:spLocks/>
+            <a:spLocks noGrp="1"/>
           </p:cNvSpPr>
           <p:nvPr>
             <p:ph type="body" idx="1"/>
@@ -9630,7 +9629,7 @@
         <p:nvSpPr>
           <p:cNvPr id="3077" name="Rectangle 5"/>
           <p:cNvSpPr>
-            <a:spLocks/>
+            <a:spLocks noGrp="1"/>
           </p:cNvSpPr>
           <p:nvPr>
             <p:ph type="sldNum" sz="quarter" idx="2"/>
@@ -10740,7 +10739,7 @@
         <p:nvSpPr>
           <p:cNvPr id="5128" name="Rectangle 8"/>
           <p:cNvSpPr>
-            <a:spLocks noChangeArrowheads="1"/>
+            <a:spLocks noGrp="1" noChangeArrowheads="1"/>
           </p:cNvSpPr>
           <p:nvPr>
             <p:ph type="body" idx="1"/>
@@ -10898,6 +10897,13 @@
     <a:masterClrMapping/>
   </p:clrMapOvr>
   <p:transition spd="med"/>
+  <p:timing>
+    <p:tnLst>
+      <p:par>
+        <p:cTn id="1" dur="indefinite" restart="never" nodeType="tmRoot"/>
+      </p:par>
+    </p:tnLst>
+  </p:timing>
 </p:sld>
 </file>
 
@@ -11107,7 +11113,7 @@
         <p:nvSpPr>
           <p:cNvPr id="18436" name="Rectangle 4"/>
           <p:cNvSpPr>
-            <a:spLocks noChangeArrowheads="1"/>
+            <a:spLocks noGrp="1" noChangeArrowheads="1"/>
           </p:cNvSpPr>
           <p:nvPr>
             <p:ph type="title"/>
@@ -11363,6 +11369,13 @@
   <p:transition spd="slow">
     <p:dissolve/>
   </p:transition>
+  <p:timing>
+    <p:tnLst>
+      <p:par>
+        <p:cTn id="1" dur="indefinite" restart="never" nodeType="tmRoot"/>
+      </p:par>
+    </p:tnLst>
+  </p:timing>
 </p:sld>
 </file>
 
@@ -11572,7 +11585,7 @@
         <p:nvSpPr>
           <p:cNvPr id="19460" name="Rectangle 4"/>
           <p:cNvSpPr>
-            <a:spLocks noChangeArrowheads="1"/>
+            <a:spLocks noGrp="1" noChangeArrowheads="1"/>
           </p:cNvSpPr>
           <p:nvPr>
             <p:ph type="title"/>
@@ -11612,8 +11625,8 @@
         </p:nvSpPr>
         <p:spPr bwMode="auto">
           <a:xfrm>
-            <a:off x="566738" y="2001838"/>
-            <a:ext cx="7902575" cy="1717675"/>
+            <a:off x="566739" y="2001838"/>
+            <a:ext cx="7837486" cy="1717675"/>
           </a:xfrm>
           <a:custGeom>
             <a:avLst/>
@@ -11832,15 +11845,15 @@
               <a:buChar char="•"/>
             </a:pPr>
             <a:r>
-              <a:rPr lang="en-US" altLang="en-US" sz="2600"/>
+              <a:rPr lang="en-US" altLang="en-US" sz="2400" dirty="0"/>
               <a:t>It’s not just passing all tests, it’s passing the </a:t>
             </a:r>
             <a:r>
-              <a:rPr lang="en-US" altLang="en-US" sz="2600" i="1"/>
+              <a:rPr lang="en-US" altLang="en-US" sz="2400" i="1" dirty="0"/>
               <a:t>right</a:t>
             </a:r>
             <a:r>
-              <a:rPr lang="en-US" altLang="en-US" sz="2600"/>
+              <a:rPr lang="en-US" altLang="en-US" sz="2400" dirty="0"/>
               <a:t> tests</a:t>
             </a:r>
           </a:p>
@@ -11851,7 +11864,7 @@
               <a:buChar char="•"/>
             </a:pPr>
             <a:r>
-              <a:rPr lang="en-US" altLang="en-US" sz="2600"/>
+              <a:rPr lang="en-US" altLang="en-US" sz="2400" dirty="0"/>
               <a:t>An empty test suite will pass, but isn’t very helpful</a:t>
             </a:r>
           </a:p>
@@ -11862,10 +11875,9 @@
               <a:buChar char="•"/>
             </a:pPr>
             <a:r>
-              <a:rPr lang="en-US" altLang="en-US" sz="2600"/>
+              <a:rPr lang="en-US" altLang="en-US" sz="2400" dirty="0"/>
               <a:t>Testing the wrong thing may pass, but isn’t very helpful</a:t>
             </a:r>
-            <a:endParaRPr lang="en-US" altLang="en-US"/>
           </a:p>
         </p:txBody>
       </p:sp>
@@ -12110,7 +12122,7 @@
         </p:blipFill>
         <p:spPr bwMode="auto">
           <a:xfrm>
-            <a:off x="1955800" y="4079875"/>
+            <a:off x="1752600" y="3997326"/>
             <a:ext cx="5694363" cy="1717675"/>
           </a:xfrm>
           <a:prstGeom prst="rect">
@@ -12160,8 +12172,15 @@
     <a:masterClrMapping/>
   </p:clrMapOvr>
   <p:transition spd="slow">
-    <p:dissolve/>
+    <p:wipe/>
   </p:transition>
+  <p:timing>
+    <p:tnLst>
+      <p:par>
+        <p:cTn id="1" dur="indefinite" restart="never" nodeType="tmRoot"/>
+      </p:par>
+    </p:tnLst>
+  </p:timing>
 </p:sld>
 </file>
 
@@ -12371,7 +12390,7 @@
         <p:nvSpPr>
           <p:cNvPr id="20484" name="Rectangle 4"/>
           <p:cNvSpPr>
-            <a:spLocks noChangeArrowheads="1"/>
+            <a:spLocks noGrp="1" noChangeArrowheads="1"/>
           </p:cNvSpPr>
           <p:nvPr>
             <p:ph type="title"/>
@@ -12940,8 +12959,15 @@
     <a:masterClrMapping/>
   </p:clrMapOvr>
   <p:transition spd="slow">
-    <p:dissolve/>
+    <p:wipe/>
   </p:transition>
+  <p:timing>
+    <p:tnLst>
+      <p:par>
+        <p:cTn id="1" dur="indefinite" restart="never" nodeType="tmRoot"/>
+      </p:par>
+    </p:tnLst>
+  </p:timing>
 </p:sld>
 </file>
 
@@ -13151,7 +13177,7 @@
         <p:nvSpPr>
           <p:cNvPr id="21508" name="Rectangle 4"/>
           <p:cNvSpPr>
-            <a:spLocks noChangeArrowheads="1"/>
+            <a:spLocks noGrp="1" noChangeArrowheads="1"/>
           </p:cNvSpPr>
           <p:nvPr>
             <p:ph type="title"/>
@@ -13722,6 +13748,13 @@
   <p:transition spd="slow">
     <p:wipe/>
   </p:transition>
+  <p:timing>
+    <p:tnLst>
+      <p:par>
+        <p:cTn id="1" dur="indefinite" restart="never" nodeType="tmRoot"/>
+      </p:par>
+    </p:tnLst>
+  </p:timing>
 </p:sld>
 </file>
 
@@ -13931,7 +13964,7 @@
         <p:nvSpPr>
           <p:cNvPr id="22532" name="Rectangle 4"/>
           <p:cNvSpPr>
-            <a:spLocks noChangeArrowheads="1"/>
+            <a:spLocks noGrp="1" noChangeArrowheads="1"/>
           </p:cNvSpPr>
           <p:nvPr>
             <p:ph type="title"/>
@@ -14491,6 +14524,13 @@
   <p:transition spd="slow">
     <p:wipe/>
   </p:transition>
+  <p:timing>
+    <p:tnLst>
+      <p:par>
+        <p:cTn id="1" dur="indefinite" restart="never" nodeType="tmRoot"/>
+      </p:par>
+    </p:tnLst>
+  </p:timing>
 </p:sld>
 </file>
 
@@ -14700,7 +14740,7 @@
         <p:nvSpPr>
           <p:cNvPr id="23556" name="Rectangle 4"/>
           <p:cNvSpPr>
-            <a:spLocks noChangeArrowheads="1"/>
+            <a:spLocks noGrp="1" noChangeArrowheads="1"/>
           </p:cNvSpPr>
           <p:nvPr>
             <p:ph type="title"/>
@@ -15379,6 +15419,13 @@
   <p:transition spd="slow">
     <p:wipe/>
   </p:transition>
+  <p:timing>
+    <p:tnLst>
+      <p:par>
+        <p:cTn id="1" dur="indefinite" restart="never" nodeType="tmRoot"/>
+      </p:par>
+    </p:tnLst>
+  </p:timing>
 </p:sld>
 </file>
 
@@ -15588,7 +15635,7 @@
         <p:nvSpPr>
           <p:cNvPr id="24580" name="Rectangle 4"/>
           <p:cNvSpPr>
-            <a:spLocks noChangeArrowheads="1"/>
+            <a:spLocks noGrp="1" noChangeArrowheads="1"/>
           </p:cNvSpPr>
           <p:nvPr>
             <p:ph type="title"/>
@@ -16148,6 +16195,13 @@
   <p:transition spd="slow">
     <p:wipe/>
   </p:transition>
+  <p:timing>
+    <p:tnLst>
+      <p:par>
+        <p:cTn id="1" dur="indefinite" restart="never" nodeType="tmRoot"/>
+      </p:par>
+    </p:tnLst>
+  </p:timing>
 </p:sld>
 </file>
 
@@ -16357,7 +16411,7 @@
         <p:nvSpPr>
           <p:cNvPr id="25604" name="Rectangle 4"/>
           <p:cNvSpPr>
-            <a:spLocks noChangeArrowheads="1"/>
+            <a:spLocks noGrp="1" noChangeArrowheads="1"/>
           </p:cNvSpPr>
           <p:nvPr>
             <p:ph type="title"/>
@@ -16610,9 +16664,25 @@
   <p:clrMapOvr>
     <a:masterClrMapping/>
   </p:clrMapOvr>
-  <p:transition spd="slow">
-    <p:wipe/>
-  </p:transition>
+  <mc:AlternateContent xmlns:mc="http://schemas.openxmlformats.org/markup-compatibility/2006" xmlns:p14="http://schemas.microsoft.com/office/powerpoint/2010/main">
+    <mc:Choice Requires="p14">
+      <p:transition p14:dur="100">
+        <p:cut/>
+      </p:transition>
+    </mc:Choice>
+    <mc:Fallback xmlns="">
+      <p:transition>
+        <p:cut/>
+      </p:transition>
+    </mc:Fallback>
+  </mc:AlternateContent>
+  <p:timing>
+    <p:tnLst>
+      <p:par>
+        <p:cTn id="1" dur="indefinite" restart="never" nodeType="tmRoot"/>
+      </p:par>
+    </p:tnLst>
+  </p:timing>
 </p:sld>
 </file>
 
@@ -17335,6 +17405,13 @@
   <p:transition spd="slow">
     <p:dissolve/>
   </p:transition>
+  <p:timing>
+    <p:tnLst>
+      <p:par>
+        <p:cTn id="1" dur="indefinite" restart="never" nodeType="tmRoot"/>
+      </p:par>
+    </p:tnLst>
+  </p:timing>
 </p:sld>
 </file>
 
@@ -17544,7 +17621,7 @@
         <p:nvSpPr>
           <p:cNvPr id="27652" name="Rectangle 4"/>
           <p:cNvSpPr>
-            <a:spLocks noChangeArrowheads="1"/>
+            <a:spLocks noGrp="1" noChangeArrowheads="1"/>
           </p:cNvSpPr>
           <p:nvPr>
             <p:ph type="title"/>
@@ -18078,9 +18155,21 @@
   <p:clrMapOvr>
     <a:masterClrMapping/>
   </p:clrMapOvr>
-  <p:transition spd="slow">
-    <p:dissolve/>
-  </p:transition>
+  <mc:AlternateContent xmlns:mc="http://schemas.openxmlformats.org/markup-compatibility/2006" xmlns:p14="http://schemas.microsoft.com/office/powerpoint/2010/main">
+    <mc:Choice Requires="p14">
+      <p:transition p14:dur="0"/>
+    </mc:Choice>
+    <mc:Fallback xmlns="">
+      <p:transition/>
+    </mc:Fallback>
+  </mc:AlternateContent>
+  <p:timing>
+    <p:tnLst>
+      <p:par>
+        <p:cTn id="1" dur="indefinite" restart="never" nodeType="tmRoot"/>
+      </p:par>
+    </p:tnLst>
+  </p:timing>
 </p:sld>
 </file>
 
@@ -18472,6 +18561,13 @@
     <a:masterClrMapping/>
   </p:clrMapOvr>
   <p:transition spd="med"/>
+  <p:timing>
+    <p:tnLst>
+      <p:par>
+        <p:cTn id="1" dur="indefinite" restart="never" nodeType="tmRoot"/>
+      </p:par>
+    </p:tnLst>
+  </p:timing>
 </p:sld>
 </file>
 
@@ -18681,7 +18777,7 @@
         <p:nvSpPr>
           <p:cNvPr id="28676" name="Rectangle 4"/>
           <p:cNvSpPr>
-            <a:spLocks noChangeArrowheads="1"/>
+            <a:spLocks noGrp="1" noChangeArrowheads="1"/>
           </p:cNvSpPr>
           <p:nvPr>
             <p:ph type="title"/>
@@ -19002,8 +19098,15 @@
     <a:masterClrMapping/>
   </p:clrMapOvr>
   <p:transition spd="slow">
-    <p:dissolve/>
+    <p:wipe/>
   </p:transition>
+  <p:timing>
+    <p:tnLst>
+      <p:par>
+        <p:cTn id="1" dur="indefinite" restart="never" nodeType="tmRoot"/>
+      </p:par>
+    </p:tnLst>
+  </p:timing>
 </p:sld>
 </file>
 
@@ -19213,7 +19316,7 @@
         <p:nvSpPr>
           <p:cNvPr id="29700" name="Rectangle 4"/>
           <p:cNvSpPr>
-            <a:spLocks noChangeArrowheads="1"/>
+            <a:spLocks noGrp="1" noChangeArrowheads="1"/>
           </p:cNvSpPr>
           <p:nvPr>
             <p:ph type="title"/>
@@ -19736,9 +19839,21 @@
   <p:clrMapOvr>
     <a:masterClrMapping/>
   </p:clrMapOvr>
-  <p:transition spd="slow">
-    <p:wipe/>
-  </p:transition>
+  <mc:AlternateContent xmlns:mc="http://schemas.openxmlformats.org/markup-compatibility/2006" xmlns:p14="http://schemas.microsoft.com/office/powerpoint/2010/main">
+    <mc:Choice Requires="p14">
+      <p:transition p14:dur="0"/>
+    </mc:Choice>
+    <mc:Fallback xmlns="">
+      <p:transition/>
+    </mc:Fallback>
+  </mc:AlternateContent>
+  <p:timing>
+    <p:tnLst>
+      <p:par>
+        <p:cTn id="1" dur="indefinite" restart="never" nodeType="tmRoot"/>
+      </p:par>
+    </p:tnLst>
+  </p:timing>
 </p:sld>
 </file>
 
@@ -19948,7 +20063,7 @@
         <p:nvSpPr>
           <p:cNvPr id="30724" name="Rectangle 4"/>
           <p:cNvSpPr>
-            <a:spLocks noChangeArrowheads="1"/>
+            <a:spLocks noGrp="1" noChangeArrowheads="1"/>
           </p:cNvSpPr>
           <p:nvPr>
             <p:ph type="title"/>
@@ -20269,8 +20384,15 @@
     <a:masterClrMapping/>
   </p:clrMapOvr>
   <p:transition spd="slow">
-    <p:dissolve/>
+    <p:wipe/>
   </p:transition>
+  <p:timing>
+    <p:tnLst>
+      <p:par>
+        <p:cTn id="1" dur="indefinite" restart="never" nodeType="tmRoot"/>
+      </p:par>
+    </p:tnLst>
+  </p:timing>
 </p:sld>
 </file>
 
@@ -20480,7 +20602,7 @@
         <p:nvSpPr>
           <p:cNvPr id="31748" name="Rectangle 4"/>
           <p:cNvSpPr>
-            <a:spLocks noChangeArrowheads="1"/>
+            <a:spLocks noGrp="1" noChangeArrowheads="1"/>
           </p:cNvSpPr>
           <p:nvPr>
             <p:ph type="title"/>
@@ -20733,9 +20855,25 @@
   <p:clrMapOvr>
     <a:masterClrMapping/>
   </p:clrMapOvr>
-  <p:transition spd="slow">
-    <p:wipe/>
-  </p:transition>
+  <mc:AlternateContent xmlns:mc="http://schemas.openxmlformats.org/markup-compatibility/2006" xmlns:p14="http://schemas.microsoft.com/office/powerpoint/2010/main">
+    <mc:Choice Requires="p14">
+      <p:transition p14:dur="100">
+        <p:cut/>
+      </p:transition>
+    </mc:Choice>
+    <mc:Fallback xmlns="">
+      <p:transition>
+        <p:cut/>
+      </p:transition>
+    </mc:Fallback>
+  </mc:AlternateContent>
+  <p:timing>
+    <p:tnLst>
+      <p:par>
+        <p:cTn id="1" dur="indefinite" restart="never" nodeType="tmRoot"/>
+      </p:par>
+    </p:tnLst>
+  </p:timing>
 </p:sld>
 </file>
 
@@ -21012,7 +21150,7 @@
         <p:nvSpPr>
           <p:cNvPr id="32773" name="Rectangle 5"/>
           <p:cNvSpPr>
-            <a:spLocks noChangeArrowheads="1"/>
+            <a:spLocks noGrp="1" noChangeArrowheads="1"/>
           </p:cNvSpPr>
           <p:nvPr>
             <p:ph type="title"/>
@@ -21516,6 +21654,13 @@
   <p:transition spd="slow">
     <p:dissolve/>
   </p:transition>
+  <p:timing>
+    <p:tnLst>
+      <p:par>
+        <p:cTn id="1" dur="indefinite" restart="never" nodeType="tmRoot"/>
+      </p:par>
+    </p:tnLst>
+  </p:timing>
 </p:sld>
 </file>
 
@@ -21792,7 +21937,7 @@
         <p:nvSpPr>
           <p:cNvPr id="33797" name="Rectangle 5"/>
           <p:cNvSpPr>
-            <a:spLocks noChangeArrowheads="1"/>
+            <a:spLocks noGrp="1" noChangeArrowheads="1"/>
           </p:cNvSpPr>
           <p:nvPr>
             <p:ph type="title"/>
@@ -22415,9 +22560,25 @@
   <p:clrMapOvr>
     <a:masterClrMapping/>
   </p:clrMapOvr>
-  <p:transition spd="slow">
-    <p:dissolve/>
-  </p:transition>
+  <mc:AlternateContent xmlns:mc="http://schemas.openxmlformats.org/markup-compatibility/2006" xmlns:p14="http://schemas.microsoft.com/office/powerpoint/2010/main">
+    <mc:Choice Requires="p14">
+      <p:transition spd="med" p14:dur="700">
+        <p:fade/>
+      </p:transition>
+    </mc:Choice>
+    <mc:Fallback xmlns="">
+      <p:transition spd="med">
+        <p:fade/>
+      </p:transition>
+    </mc:Fallback>
+  </mc:AlternateContent>
+  <p:timing>
+    <p:tnLst>
+      <p:par>
+        <p:cTn id="1" dur="indefinite" restart="never" nodeType="tmRoot"/>
+      </p:par>
+    </p:tnLst>
+  </p:timing>
 </p:sld>
 </file>
 
@@ -23408,6 +23569,13 @@
   <p:transition spd="slow">
     <p:dissolve/>
   </p:transition>
+  <p:timing>
+    <p:tnLst>
+      <p:par>
+        <p:cTn id="1" dur="indefinite" restart="never" nodeType="tmRoot"/>
+      </p:par>
+    </p:tnLst>
+  </p:timing>
 </p:sld>
 </file>
 
@@ -24508,9 +24676,25 @@
   <p:clrMapOvr>
     <a:masterClrMapping/>
   </p:clrMapOvr>
-  <p:transition spd="slow">
-    <p:dissolve/>
-  </p:transition>
+  <mc:AlternateContent xmlns:mc="http://schemas.openxmlformats.org/markup-compatibility/2006" xmlns:p14="http://schemas.microsoft.com/office/powerpoint/2010/main">
+    <mc:Choice Requires="p14">
+      <p:transition spd="med" p14:dur="700">
+        <p:fade/>
+      </p:transition>
+    </mc:Choice>
+    <mc:Fallback xmlns="">
+      <p:transition spd="med">
+        <p:fade/>
+      </p:transition>
+    </mc:Fallback>
+  </mc:AlternateContent>
+  <p:timing>
+    <p:tnLst>
+      <p:par>
+        <p:cTn id="1" dur="indefinite" restart="never" nodeType="tmRoot"/>
+      </p:par>
+    </p:tnLst>
+  </p:timing>
 </p:sld>
 </file>
 
@@ -25490,6 +25674,13 @@
   <p:transition spd="slow">
     <p:dissolve/>
   </p:transition>
+  <p:timing>
+    <p:tnLst>
+      <p:par>
+        <p:cTn id="1" dur="indefinite" restart="never" nodeType="tmRoot"/>
+      </p:par>
+    </p:tnLst>
+  </p:timing>
 </p:sld>
 </file>
 
@@ -26578,9 +26769,25 @@
   <p:clrMapOvr>
     <a:masterClrMapping/>
   </p:clrMapOvr>
-  <p:transition spd="slow">
-    <p:dissolve/>
-  </p:transition>
+  <mc:AlternateContent xmlns:mc="http://schemas.openxmlformats.org/markup-compatibility/2006" xmlns:p14="http://schemas.microsoft.com/office/powerpoint/2010/main">
+    <mc:Choice Requires="p14">
+      <p:transition spd="med" p14:dur="700">
+        <p:fade/>
+      </p:transition>
+    </mc:Choice>
+    <mc:Fallback xmlns="">
+      <p:transition spd="med">
+        <p:fade/>
+      </p:transition>
+    </mc:Fallback>
+  </mc:AlternateContent>
+  <p:timing>
+    <p:tnLst>
+      <p:par>
+        <p:cTn id="1" dur="indefinite" restart="never" nodeType="tmRoot"/>
+      </p:par>
+    </p:tnLst>
+  </p:timing>
 </p:sld>
 </file>
 
@@ -26790,7 +26997,7 @@
         <p:nvSpPr>
           <p:cNvPr id="9220" name="Rectangle 4"/>
           <p:cNvSpPr>
-            <a:spLocks noChangeArrowheads="1"/>
+            <a:spLocks noGrp="1" noChangeArrowheads="1"/>
           </p:cNvSpPr>
           <p:nvPr>
             <p:ph type="title"/>
@@ -27047,6 +27254,13 @@
     <a:masterClrMapping/>
   </p:clrMapOvr>
   <p:transition spd="med"/>
+  <p:timing>
+    <p:tnLst>
+      <p:par>
+        <p:cTn id="1" dur="indefinite" restart="never" nodeType="tmRoot"/>
+      </p:par>
+    </p:tnLst>
+  </p:timing>
 </p:sld>
 </file>
 
@@ -28041,6 +28255,13 @@
   <p:transition spd="slow">
     <p:dissolve/>
   </p:transition>
+  <p:timing>
+    <p:tnLst>
+      <p:par>
+        <p:cTn id="1" dur="indefinite" restart="never" nodeType="tmRoot"/>
+      </p:par>
+    </p:tnLst>
+  </p:timing>
 </p:sld>
 </file>
 
@@ -29144,9 +29365,25 @@
   <p:clrMapOvr>
     <a:masterClrMapping/>
   </p:clrMapOvr>
-  <p:transition spd="slow">
-    <p:dissolve/>
-  </p:transition>
+  <mc:AlternateContent xmlns:mc="http://schemas.openxmlformats.org/markup-compatibility/2006" xmlns:p14="http://schemas.microsoft.com/office/powerpoint/2010/main">
+    <mc:Choice Requires="p14">
+      <p:transition spd="med" p14:dur="700">
+        <p:fade/>
+      </p:transition>
+    </mc:Choice>
+    <mc:Fallback xmlns="">
+      <p:transition spd="med">
+        <p:fade/>
+      </p:transition>
+    </mc:Fallback>
+  </mc:AlternateContent>
+  <p:timing>
+    <p:tnLst>
+      <p:par>
+        <p:cTn id="1" dur="indefinite" restart="never" nodeType="tmRoot"/>
+      </p:par>
+    </p:tnLst>
+  </p:timing>
 </p:sld>
 </file>
 
@@ -29582,7 +29819,7 @@
               <a:buChar char="•"/>
             </a:pPr>
             <a:r>
-              <a:rPr lang="en-US" altLang="en-US" sz="2600"/>
+              <a:rPr lang="en-US" altLang="en-US" sz="2400" dirty="0"/>
               <a:t>We run all unit tests prior to declaring our work done</a:t>
             </a:r>
           </a:p>
@@ -29593,7 +29830,7 @@
               <a:buChar char="•"/>
             </a:pPr>
             <a:r>
-              <a:rPr lang="en-US" altLang="en-US" sz="2600"/>
+              <a:rPr lang="en-US" altLang="en-US" sz="2400" dirty="0"/>
               <a:t>actually usually Jenkins does it for us</a:t>
             </a:r>
           </a:p>
@@ -29604,7 +29841,7 @@
               <a:buChar char="•"/>
             </a:pPr>
             <a:r>
-              <a:rPr lang="en-US" altLang="en-US" sz="2600"/>
+              <a:rPr lang="en-US" altLang="en-US" sz="2400" dirty="0"/>
               <a:t>We run full regression and function testing against a test environment</a:t>
             </a:r>
           </a:p>
@@ -29615,7 +29852,7 @@
               <a:buChar char="•"/>
             </a:pPr>
             <a:r>
-              <a:rPr lang="en-US" altLang="en-US" sz="2600"/>
+              <a:rPr lang="en-US" altLang="en-US" sz="2400" dirty="0"/>
               <a:t>We run all function tests and a subset of regression tests post-deploy against production</a:t>
             </a:r>
           </a:p>
@@ -29626,7 +29863,7 @@
               <a:buChar char="•"/>
             </a:pPr>
             <a:r>
-              <a:rPr lang="en-US" altLang="en-US" sz="2600"/>
+              <a:rPr lang="en-US" altLang="en-US" sz="2400" dirty="0"/>
               <a:t>We devote resources to making sure all tests can be run against all our environments</a:t>
             </a:r>
           </a:p>
@@ -29637,10 +29874,10 @@
               <a:buChar char="•"/>
             </a:pPr>
             <a:r>
-              <a:rPr lang="en-US" altLang="en-US" sz="2600"/>
+              <a:rPr lang="en-US" altLang="en-US" sz="2400" dirty="0"/>
               <a:t>Test Engineers, not QA</a:t>
             </a:r>
-            <a:endParaRPr lang="en-US" altLang="en-US"/>
+            <a:endParaRPr lang="en-US" altLang="en-US" dirty="0"/>
           </a:p>
         </p:txBody>
       </p:sp>
@@ -30103,6 +30340,13 @@
   <p:transition spd="slow">
     <p:dissolve/>
   </p:transition>
+  <p:timing>
+    <p:tnLst>
+      <p:par>
+        <p:cTn id="1" dur="indefinite" restart="never" nodeType="tmRoot"/>
+      </p:par>
+    </p:tnLst>
+  </p:timing>
 </p:sld>
 </file>
 
@@ -30125,7 +30369,7 @@
       </p:grpSpPr>
       <p:pic>
         <p:nvPicPr>
-          <p:cNvPr id="41985" name="Picture 1" descr="CMM_Logo.eps"/>
+          <p:cNvPr id="40961" name="Picture 1" descr="CMM_Logo.eps"/>
           <p:cNvPicPr>
             <a:picLocks noChangeAspect="1"/>
           </p:cNvPicPr>
@@ -30192,7 +30436,7 @@
       </p:pic>
       <p:sp>
         <p:nvSpPr>
-          <p:cNvPr id="41986" name="Line 2"/>
+          <p:cNvPr id="40962" name="Line 2"/>
           <p:cNvSpPr>
             <a:spLocks noChangeShapeType="1"/>
           </p:cNvSpPr>
@@ -30251,7 +30495,7 @@
       </p:sp>
       <p:sp>
         <p:nvSpPr>
-          <p:cNvPr id="41987" name="Line 3"/>
+          <p:cNvPr id="40963" name="Line 3"/>
           <p:cNvSpPr>
             <a:spLocks noChangeShapeType="1"/>
           </p:cNvSpPr>
@@ -30310,7 +30554,7 @@
       </p:sp>
       <p:sp>
         <p:nvSpPr>
-          <p:cNvPr id="41988" name="AutoShape 4"/>
+          <p:cNvPr id="40964" name="AutoShape 4"/>
           <p:cNvSpPr>
             <a:spLocks/>
           </p:cNvSpPr>
@@ -30405,7 +30649,7 @@
           </a:extLst>
         </p:spPr>
         <p:txBody>
-          <a:bodyPr lIns="0" tIns="0" rIns="0" bIns="0"/>
+          <a:bodyPr lIns="45719" tIns="45719" rIns="45719" bIns="45719"/>
           <a:lstStyle>
             <a:lvl1pPr marL="742950" indent="-742950">
               <a:defRPr>
@@ -30538,7 +30782,7 @@
               <a:buChar char="•"/>
             </a:pPr>
             <a:r>
-              <a:rPr lang="en-US" altLang="en-US" sz="2600"/>
+              <a:rPr lang="en-US" altLang="en-US" sz="2400" dirty="0"/>
               <a:t>We run all unit tests prior to declaring our work done</a:t>
             </a:r>
           </a:p>
@@ -30549,7 +30793,7 @@
               <a:buChar char="•"/>
             </a:pPr>
             <a:r>
-              <a:rPr lang="en-US" altLang="en-US" sz="2600"/>
+              <a:rPr lang="en-US" altLang="en-US" sz="2400" dirty="0"/>
               <a:t>actually usually Jenkins does it for us</a:t>
             </a:r>
           </a:p>
@@ -30560,7 +30804,7 @@
               <a:buChar char="•"/>
             </a:pPr>
             <a:r>
-              <a:rPr lang="en-US" altLang="en-US" sz="2600"/>
+              <a:rPr lang="en-US" altLang="en-US" sz="2400" dirty="0"/>
               <a:t>We run full regression and function testing against a test environment</a:t>
             </a:r>
           </a:p>
@@ -30571,7 +30815,7 @@
               <a:buChar char="•"/>
             </a:pPr>
             <a:r>
-              <a:rPr lang="en-US" altLang="en-US" sz="2600"/>
+              <a:rPr lang="en-US" altLang="en-US" sz="2400" dirty="0"/>
               <a:t>We run all function tests and a subset of regression tests post-deploy against production</a:t>
             </a:r>
           </a:p>
@@ -30582,7 +30826,7 @@
               <a:buChar char="•"/>
             </a:pPr>
             <a:r>
-              <a:rPr lang="en-US" altLang="en-US" sz="2600"/>
+              <a:rPr lang="en-US" altLang="en-US" sz="2400" dirty="0"/>
               <a:t>We devote resources to making sure all tests can be run against all our environments</a:t>
             </a:r>
           </a:p>
@@ -30593,16 +30837,16 @@
               <a:buChar char="•"/>
             </a:pPr>
             <a:r>
-              <a:rPr lang="en-US" altLang="en-US" sz="2600"/>
+              <a:rPr lang="en-US" altLang="en-US" sz="2400" dirty="0"/>
               <a:t>Test Engineers, not QA</a:t>
             </a:r>
-            <a:endParaRPr lang="en-US" altLang="en-US"/>
+            <a:endParaRPr lang="en-US" altLang="en-US" dirty="0"/>
           </a:p>
         </p:txBody>
       </p:sp>
       <p:sp>
         <p:nvSpPr>
-          <p:cNvPr id="41989" name="AutoShape 5"/>
+          <p:cNvPr id="40965" name="AutoShape 5"/>
           <p:cNvSpPr>
             <a:spLocks/>
           </p:cNvSpPr>
@@ -30706,7 +30950,7 @@
       </p:sp>
       <p:sp>
         <p:nvSpPr>
-          <p:cNvPr id="41990" name="AutoShape 6"/>
+          <p:cNvPr id="40966" name="AutoShape 6"/>
           <p:cNvSpPr>
             <a:spLocks/>
           </p:cNvSpPr>
@@ -30820,7 +31064,7 @@
       </p:sp>
       <p:sp>
         <p:nvSpPr>
-          <p:cNvPr id="41991" name="AutoShape 7"/>
+          <p:cNvPr id="40967" name="AutoShape 7"/>
           <p:cNvSpPr>
             <a:spLocks/>
           </p:cNvSpPr>
@@ -30828,8 +31072,8 @@
         </p:nvSpPr>
         <p:spPr bwMode="auto">
           <a:xfrm>
-            <a:off x="5029200" y="5653088"/>
-            <a:ext cx="3414713" cy="369887"/>
+            <a:off x="785813" y="1293813"/>
+            <a:ext cx="7772400" cy="641350"/>
           </a:xfrm>
           <a:custGeom>
             <a:avLst/>
@@ -30915,119 +31159,7 @@
           </a:extLst>
         </p:spPr>
         <p:txBody>
-          <a:bodyPr lIns="0" tIns="0" rIns="0" bIns="0"/>
-          <a:lstStyle/>
-          <a:p>
-            <a:r>
-              <a:rPr lang="en-US" altLang="en-US">
-                <a:solidFill>
-                  <a:srgbClr val="FF2600"/>
-                </a:solidFill>
-              </a:rPr>
-              <a:t>This is the actual ‘passes tests’ part.</a:t>
-            </a:r>
-            <a:endParaRPr lang="en-US" altLang="en-US"/>
-          </a:p>
-        </p:txBody>
-      </p:sp>
-      <p:sp>
-        <p:nvSpPr>
-          <p:cNvPr id="41992" name="AutoShape 8"/>
-          <p:cNvSpPr>
-            <a:spLocks/>
-          </p:cNvSpPr>
-          <p:nvPr/>
-        </p:nvSpPr>
-        <p:spPr bwMode="auto">
-          <a:xfrm>
-            <a:off x="785813" y="1293813"/>
-            <a:ext cx="7772400" cy="641350"/>
-          </a:xfrm>
-          <a:custGeom>
-            <a:avLst/>
-            <a:gdLst>
-              <a:gd name="T0" fmla="*/ 10800 w 21600"/>
-              <a:gd name="T1" fmla="*/ 10800 h 21600"/>
-              <a:gd name="T2" fmla="*/ 10800 w 21600"/>
-              <a:gd name="T3" fmla="*/ 10800 h 21600"/>
-              <a:gd name="T4" fmla="*/ 10800 w 21600"/>
-              <a:gd name="T5" fmla="*/ 10800 h 21600"/>
-              <a:gd name="T6" fmla="*/ 10800 w 21600"/>
-              <a:gd name="T7" fmla="*/ 10800 h 21600"/>
-            </a:gdLst>
-            <a:ahLst/>
-            <a:cxnLst>
-              <a:cxn ang="0">
-                <a:pos x="T0" y="T1"/>
-              </a:cxn>
-              <a:cxn ang="0">
-                <a:pos x="T2" y="T3"/>
-              </a:cxn>
-              <a:cxn ang="0">
-                <a:pos x="T4" y="T5"/>
-              </a:cxn>
-              <a:cxn ang="0">
-                <a:pos x="T6" y="T7"/>
-              </a:cxn>
-            </a:cxnLst>
-            <a:rect l="0" t="0" r="r" b="b"/>
-            <a:pathLst>
-              <a:path w="21600" h="21600">
-                <a:moveTo>
-                  <a:pt x="0" y="0"/>
-                </a:moveTo>
-                <a:lnTo>
-                  <a:pt x="21599" y="0"/>
-                </a:lnTo>
-                <a:lnTo>
-                  <a:pt x="21599" y="21599"/>
-                </a:lnTo>
-                <a:lnTo>
-                  <a:pt x="0" y="21599"/>
-                </a:lnTo>
-                <a:close/>
-              </a:path>
-            </a:pathLst>
-          </a:custGeom>
-          <a:noFill/>
-          <a:ln>
-            <a:noFill/>
-          </a:ln>
-          <a:effectLst/>
-          <a:extLst>
-            <a:ext uri="{909E8E84-426E-40DD-AFC4-6F175D3DCCD1}">
-              <a14:hiddenFill xmlns:a14="http://schemas.microsoft.com/office/drawing/2010/main">
-                <a:solidFill>
-                  <a:srgbClr val="FFFFFF"/>
-                </a:solidFill>
-              </a14:hiddenFill>
-            </a:ext>
-            <a:ext uri="{91240B29-F687-4F45-9708-019B960494DF}">
-              <a14:hiddenLine xmlns:a14="http://schemas.microsoft.com/office/drawing/2010/main" w="12700" cap="flat" cmpd="sng">
-                <a:solidFill>
-                  <a:srgbClr val="000000"/>
-                </a:solidFill>
-                <a:prstDash val="solid"/>
-                <a:miter lim="0"/>
-                <a:headEnd/>
-                <a:tailEnd/>
-              </a14:hiddenLine>
-            </a:ext>
-            <a:ext uri="{AF507438-7753-43E0-B8FC-AC1667EBCBE1}">
-              <a14:hiddenEffects xmlns:a14="http://schemas.microsoft.com/office/drawing/2010/main">
-                <a:effectLst>
-                  <a:outerShdw blurRad="63500" dist="38099" dir="2700000" algn="ctr" rotWithShape="0">
-                    <a:srgbClr val="000000">
-                      <a:alpha val="74998"/>
-                    </a:srgbClr>
-                  </a:outerShdw>
-                </a:effectLst>
-              </a14:hiddenEffects>
-            </a:ext>
-          </a:extLst>
-        </p:spPr>
-        <p:txBody>
-          <a:bodyPr lIns="0" tIns="0" rIns="0" bIns="0"/>
+          <a:bodyPr lIns="45719" tIns="45719" rIns="45719" bIns="45719"/>
           <a:lstStyle>
             <a:lvl1pPr defTabSz="365125">
               <a:defRPr>
@@ -31163,14 +31295,73 @@
           </a:p>
         </p:txBody>
       </p:sp>
+      <p:sp>
+        <p:nvSpPr>
+          <p:cNvPr id="3" name="TextBox 2"/>
+          <p:cNvSpPr txBox="1"/>
+          <p:nvPr/>
+        </p:nvSpPr>
+        <p:spPr>
+          <a:xfrm>
+            <a:off x="5334000" y="5384839"/>
+            <a:ext cx="2940164" cy="369332"/>
+          </a:xfrm>
+          <a:prstGeom prst="rect">
+            <a:avLst/>
+          </a:prstGeom>
+          <a:noFill/>
+        </p:spPr>
+        <p:txBody>
+          <a:bodyPr wrap="none" rtlCol="0">
+            <a:spAutoFit/>
+          </a:bodyPr>
+          <a:lstStyle/>
+          <a:p>
+            <a:r>
+              <a:rPr lang="en-US" dirty="0" smtClean="0">
+                <a:solidFill>
+                  <a:srgbClr val="FF0000"/>
+                </a:solidFill>
+              </a:rPr>
+              <a:t>The actual ‘passes tests’ part.</a:t>
+            </a:r>
+            <a:endParaRPr lang="en-US" dirty="0">
+              <a:solidFill>
+                <a:srgbClr val="FF0000"/>
+              </a:solidFill>
+            </a:endParaRPr>
+          </a:p>
+        </p:txBody>
+      </p:sp>
     </p:spTree>
+    <p:extLst>
+      <p:ext uri="{BB962C8B-B14F-4D97-AF65-F5344CB8AC3E}">
+        <p14:creationId xmlns:p14="http://schemas.microsoft.com/office/powerpoint/2010/main" val="1679497984"/>
+      </p:ext>
+    </p:extLst>
   </p:cSld>
   <p:clrMapOvr>
     <a:masterClrMapping/>
   </p:clrMapOvr>
-  <p:transition spd="slow">
-    <p:dissolve/>
-  </p:transition>
+  <mc:AlternateContent xmlns:mc="http://schemas.openxmlformats.org/markup-compatibility/2006" xmlns:p14="http://schemas.microsoft.com/office/powerpoint/2010/main">
+    <mc:Choice Requires="p14">
+      <p:transition spd="med" p14:dur="700">
+        <p:fade/>
+      </p:transition>
+    </mc:Choice>
+    <mc:Fallback xmlns="">
+      <p:transition spd="med">
+        <p:fade/>
+      </p:transition>
+    </mc:Fallback>
+  </mc:AlternateContent>
+  <p:timing>
+    <p:tnLst>
+      <p:par>
+        <p:cTn id="1" dur="indefinite" restart="never" nodeType="tmRoot"/>
+      </p:par>
+    </p:tnLst>
+  </p:timing>
 </p:sld>
 </file>
 
@@ -32083,6 +32274,13 @@
   <p:transition spd="slow">
     <p:dissolve/>
   </p:transition>
+  <p:timing>
+    <p:tnLst>
+      <p:par>
+        <p:cTn id="1" dur="indefinite" restart="never" nodeType="tmRoot"/>
+      </p:par>
+    </p:tnLst>
+  </p:timing>
 </p:sld>
 </file>
 
@@ -32105,7 +32303,7 @@
       </p:grpSpPr>
       <p:pic>
         <p:nvPicPr>
-          <p:cNvPr id="44033" name="Picture 1" descr="CMM_Logo.eps"/>
+          <p:cNvPr id="43009" name="Picture 1" descr="CMM_Logo.eps"/>
           <p:cNvPicPr>
             <a:picLocks noChangeAspect="1"/>
           </p:cNvPicPr>
@@ -32172,7 +32370,7 @@
       </p:pic>
       <p:sp>
         <p:nvSpPr>
-          <p:cNvPr id="44034" name="Line 2"/>
+          <p:cNvPr id="43010" name="Line 2"/>
           <p:cNvSpPr>
             <a:spLocks noChangeShapeType="1"/>
           </p:cNvSpPr>
@@ -32231,7 +32429,7 @@
       </p:sp>
       <p:sp>
         <p:nvSpPr>
-          <p:cNvPr id="44035" name="Line 3"/>
+          <p:cNvPr id="43011" name="Line 3"/>
           <p:cNvSpPr>
             <a:spLocks noChangeShapeType="1"/>
           </p:cNvSpPr>
@@ -32290,7 +32488,7 @@
       </p:sp>
       <p:sp>
         <p:nvSpPr>
-          <p:cNvPr id="44036" name="AutoShape 4"/>
+          <p:cNvPr id="43012" name="AutoShape 4"/>
           <p:cNvSpPr>
             <a:spLocks/>
           </p:cNvSpPr>
@@ -32385,7 +32583,7 @@
           </a:extLst>
         </p:spPr>
         <p:txBody>
-          <a:bodyPr lIns="0" tIns="0" rIns="0" bIns="0"/>
+          <a:bodyPr lIns="45719" tIns="45719" rIns="45719" bIns="45719"/>
           <a:lstStyle>
             <a:lvl1pPr marL="742950" indent="-742950">
               <a:defRPr>
@@ -32538,7 +32736,7 @@
       </p:sp>
       <p:sp>
         <p:nvSpPr>
-          <p:cNvPr id="44037" name="AutoShape 5"/>
+          <p:cNvPr id="43013" name="AutoShape 5"/>
           <p:cNvSpPr>
             <a:spLocks/>
           </p:cNvSpPr>
@@ -32642,7 +32840,7 @@
       </p:sp>
       <p:sp>
         <p:nvSpPr>
-          <p:cNvPr id="44038" name="AutoShape 6"/>
+          <p:cNvPr id="43014" name="AutoShape 6"/>
           <p:cNvSpPr>
             <a:spLocks/>
           </p:cNvSpPr>
@@ -32756,119 +32954,7 @@
       </p:sp>
       <p:sp>
         <p:nvSpPr>
-          <p:cNvPr id="44039" name="AutoShape 7"/>
-          <p:cNvSpPr>
-            <a:spLocks/>
-          </p:cNvSpPr>
-          <p:nvPr/>
-        </p:nvSpPr>
-        <p:spPr bwMode="auto">
-          <a:xfrm>
-            <a:off x="1231900" y="4602163"/>
-            <a:ext cx="5888038" cy="369887"/>
-          </a:xfrm>
-          <a:custGeom>
-            <a:avLst/>
-            <a:gdLst>
-              <a:gd name="T0" fmla="*/ 10800 w 21600"/>
-              <a:gd name="T1" fmla="*/ 10800 h 21600"/>
-              <a:gd name="T2" fmla="*/ 10800 w 21600"/>
-              <a:gd name="T3" fmla="*/ 10800 h 21600"/>
-              <a:gd name="T4" fmla="*/ 10800 w 21600"/>
-              <a:gd name="T5" fmla="*/ 10800 h 21600"/>
-              <a:gd name="T6" fmla="*/ 10800 w 21600"/>
-              <a:gd name="T7" fmla="*/ 10800 h 21600"/>
-            </a:gdLst>
-            <a:ahLst/>
-            <a:cxnLst>
-              <a:cxn ang="0">
-                <a:pos x="T0" y="T1"/>
-              </a:cxn>
-              <a:cxn ang="0">
-                <a:pos x="T2" y="T3"/>
-              </a:cxn>
-              <a:cxn ang="0">
-                <a:pos x="T4" y="T5"/>
-              </a:cxn>
-              <a:cxn ang="0">
-                <a:pos x="T6" y="T7"/>
-              </a:cxn>
-            </a:cxnLst>
-            <a:rect l="0" t="0" r="r" b="b"/>
-            <a:pathLst>
-              <a:path w="21600" h="21600">
-                <a:moveTo>
-                  <a:pt x="0" y="0"/>
-                </a:moveTo>
-                <a:lnTo>
-                  <a:pt x="21600" y="0"/>
-                </a:lnTo>
-                <a:lnTo>
-                  <a:pt x="21600" y="21599"/>
-                </a:lnTo>
-                <a:lnTo>
-                  <a:pt x="0" y="21599"/>
-                </a:lnTo>
-                <a:close/>
-              </a:path>
-            </a:pathLst>
-          </a:custGeom>
-          <a:noFill/>
-          <a:ln>
-            <a:noFill/>
-          </a:ln>
-          <a:effectLst/>
-          <a:extLst>
-            <a:ext uri="{909E8E84-426E-40DD-AFC4-6F175D3DCCD1}">
-              <a14:hiddenFill xmlns:a14="http://schemas.microsoft.com/office/drawing/2010/main">
-                <a:solidFill>
-                  <a:srgbClr val="FFFFFF"/>
-                </a:solidFill>
-              </a14:hiddenFill>
-            </a:ext>
-            <a:ext uri="{91240B29-F687-4F45-9708-019B960494DF}">
-              <a14:hiddenLine xmlns:a14="http://schemas.microsoft.com/office/drawing/2010/main" w="12700" cap="flat" cmpd="sng">
-                <a:solidFill>
-                  <a:srgbClr val="000000"/>
-                </a:solidFill>
-                <a:prstDash val="solid"/>
-                <a:miter lim="0"/>
-                <a:headEnd/>
-                <a:tailEnd/>
-              </a14:hiddenLine>
-            </a:ext>
-            <a:ext uri="{AF507438-7753-43E0-B8FC-AC1667EBCBE1}">
-              <a14:hiddenEffects xmlns:a14="http://schemas.microsoft.com/office/drawing/2010/main">
-                <a:effectLst>
-                  <a:outerShdw blurRad="63500" dist="38099" dir="2700000" algn="ctr" rotWithShape="0">
-                    <a:srgbClr val="000000">
-                      <a:alpha val="74998"/>
-                    </a:srgbClr>
-                  </a:outerShdw>
-                </a:effectLst>
-              </a14:hiddenEffects>
-            </a:ext>
-          </a:extLst>
-        </p:spPr>
-        <p:txBody>
-          <a:bodyPr lIns="0" tIns="0" rIns="0" bIns="0"/>
-          <a:lstStyle/>
-          <a:p>
-            <a:r>
-              <a:rPr lang="en-US" altLang="en-US">
-                <a:solidFill>
-                  <a:srgbClr val="FF2600"/>
-                </a:solidFill>
-              </a:rPr>
-              <a:t>Passing tests is important, so knowing when they don’t is vital.</a:t>
-            </a:r>
-            <a:endParaRPr lang="en-US" altLang="en-US"/>
-          </a:p>
-        </p:txBody>
-      </p:sp>
-      <p:sp>
-        <p:nvSpPr>
-          <p:cNvPr id="44040" name="AutoShape 8"/>
+          <p:cNvPr id="43015" name="AutoShape 7"/>
           <p:cNvSpPr>
             <a:spLocks/>
           </p:cNvSpPr>
@@ -32963,7 +33049,7 @@
           </a:extLst>
         </p:spPr>
         <p:txBody>
-          <a:bodyPr lIns="0" tIns="0" rIns="0" bIns="0"/>
+          <a:bodyPr lIns="45719" tIns="45719" rIns="45719" bIns="45719"/>
           <a:lstStyle>
             <a:lvl1pPr defTabSz="365125">
               <a:defRPr>
@@ -33099,628 +33185,85 @@
           </a:p>
         </p:txBody>
       </p:sp>
-    </p:spTree>
-  </p:cSld>
-  <p:clrMapOvr>
-    <a:masterClrMapping/>
-  </p:clrMapOvr>
-  <p:transition spd="slow">
-    <p:dissolve/>
-  </p:transition>
-</p:sld>
-</file>
-
-<file path=ppt/slides/slide36.xml><?xml version="1.0" encoding="utf-8"?>
-<p:sld xmlns:a="http://schemas.openxmlformats.org/drawingml/2006/main" xmlns:r="http://schemas.openxmlformats.org/officeDocument/2006/relationships" xmlns:p="http://schemas.openxmlformats.org/presentationml/2006/main">
-  <p:cSld>
-    <p:spTree>
-      <p:nvGrpSpPr>
-        <p:cNvPr id="1" name=""/>
-        <p:cNvGrpSpPr/>
-        <p:nvPr/>
-      </p:nvGrpSpPr>
-      <p:grpSpPr>
-        <a:xfrm>
-          <a:off x="0" y="0"/>
-          <a:ext cx="0" cy="0"/>
-          <a:chOff x="0" y="0"/>
-          <a:chExt cx="0" cy="0"/>
-        </a:xfrm>
-      </p:grpSpPr>
-      <p:pic>
-        <p:nvPicPr>
-          <p:cNvPr id="45057" name="Picture 1" descr="CMM_Logo.eps"/>
-          <p:cNvPicPr>
-            <a:picLocks noChangeAspect="1"/>
-          </p:cNvPicPr>
+      <p:sp>
+        <p:nvSpPr>
+          <p:cNvPr id="2" name="TextBox 1"/>
+          <p:cNvSpPr txBox="1"/>
           <p:nvPr/>
-        </p:nvPicPr>
-        <p:blipFill>
-          <a:blip r:embed="rId2">
-            <a:extLst>
-              <a:ext uri="{28A0092B-C50C-407E-A947-70E740481C1C}">
-                <a14:useLocalDpi xmlns:a14="http://schemas.microsoft.com/office/drawing/2010/main" val="0"/>
-              </a:ext>
-            </a:extLst>
-          </a:blip>
-          <a:srcRect/>
-          <a:stretch>
-            <a:fillRect/>
-          </a:stretch>
-        </p:blipFill>
-        <p:spPr bwMode="auto">
+        </p:nvSpPr>
+        <p:spPr>
           <a:xfrm>
-            <a:off x="457200" y="457200"/>
-            <a:ext cx="2590800" cy="428625"/>
+            <a:off x="1655055" y="5056558"/>
+            <a:ext cx="5832302" cy="369332"/>
           </a:xfrm>
           <a:prstGeom prst="rect">
             <a:avLst/>
           </a:prstGeom>
           <a:noFill/>
-          <a:ln>
-            <a:noFill/>
-          </a:ln>
-          <a:effectLst/>
-          <a:extLst>
-            <a:ext uri="{909E8E84-426E-40DD-AFC4-6F175D3DCCD1}">
-              <a14:hiddenFill xmlns:a14="http://schemas.microsoft.com/office/drawing/2010/main">
-                <a:solidFill>
-                  <a:srgbClr val="FFFFFF"/>
-                </a:solidFill>
-              </a14:hiddenFill>
-            </a:ext>
-            <a:ext uri="{91240B29-F687-4F45-9708-019B960494DF}">
-              <a14:hiddenLine xmlns:a14="http://schemas.microsoft.com/office/drawing/2010/main" w="12700" cap="flat" cmpd="sng">
-                <a:solidFill>
-                  <a:srgbClr val="000000"/>
-                </a:solidFill>
-                <a:prstDash val="solid"/>
-                <a:miter lim="0"/>
-                <a:headEnd type="none" w="med" len="med"/>
-                <a:tailEnd type="none" w="med" len="med"/>
-              </a14:hiddenLine>
-            </a:ext>
-            <a:ext uri="{AF507438-7753-43E0-B8FC-AC1667EBCBE1}">
-              <a14:hiddenEffects xmlns:a14="http://schemas.microsoft.com/office/drawing/2010/main">
-                <a:effectLst>
-                  <a:outerShdw blurRad="63500" dist="38099" dir="2700000" algn="ctr" rotWithShape="0">
-                    <a:srgbClr val="000000">
-                      <a:alpha val="74998"/>
-                    </a:srgbClr>
-                  </a:outerShdw>
-                </a:effectLst>
-              </a14:hiddenEffects>
-            </a:ext>
-          </a:extLst>
-        </p:spPr>
-      </p:pic>
-      <p:sp>
-        <p:nvSpPr>
-          <p:cNvPr id="45058" name="Line 2"/>
-          <p:cNvSpPr>
-            <a:spLocks noChangeShapeType="1"/>
-          </p:cNvSpPr>
-          <p:nvPr/>
-        </p:nvSpPr>
-        <p:spPr bwMode="auto">
-          <a:xfrm>
-            <a:off x="3124200" y="685800"/>
-            <a:ext cx="5562600" cy="0"/>
-          </a:xfrm>
-          <a:prstGeom prst="line">
-            <a:avLst/>
-          </a:prstGeom>
-          <a:noFill/>
-          <a:ln w="25400" cap="flat" cmpd="sng">
-            <a:solidFill>
-              <a:srgbClr val="BFBFBF"/>
-            </a:solidFill>
-            <a:prstDash val="solid"/>
-            <a:round/>
-            <a:headEnd/>
-            <a:tailEnd/>
-          </a:ln>
-          <a:effectLst/>
-          <a:extLst>
-            <a:ext uri="{909E8E84-426E-40DD-AFC4-6F175D3DCCD1}">
-              <a14:hiddenFill xmlns:a14="http://schemas.microsoft.com/office/drawing/2010/main">
-                <a:noFill/>
-              </a14:hiddenFill>
-            </a:ext>
-            <a:ext uri="{AF507438-7753-43E0-B8FC-AC1667EBCBE1}">
-              <a14:hiddenEffects xmlns:a14="http://schemas.microsoft.com/office/drawing/2010/main">
-                <a:effectLst>
-                  <a:outerShdw blurRad="63500" dist="38099" dir="2700000" algn="ctr" rotWithShape="0">
-                    <a:srgbClr val="000000">
-                      <a:alpha val="74998"/>
-                    </a:srgbClr>
-                  </a:outerShdw>
-                </a:effectLst>
-              </a14:hiddenEffects>
-            </a:ext>
-          </a:extLst>
         </p:spPr>
         <p:txBody>
-          <a:bodyPr lIns="0" tIns="0" rIns="0" bIns="0"/>
+          <a:bodyPr wrap="none" rtlCol="0">
+            <a:spAutoFit/>
+          </a:bodyPr>
           <a:lstStyle/>
           <a:p>
-            <a:endParaRPr lang="en-US" altLang="en-US" sz="1200">
-              <a:latin typeface="Helvetica" charset="0"/>
-              <a:ea typeface="Helvetica" charset="0"/>
-              <a:cs typeface="Helvetica" charset="0"/>
-              <a:sym typeface="Helvetica" charset="0"/>
+            <a:r>
+              <a:rPr lang="en-US" dirty="0" smtClean="0">
+                <a:solidFill>
+                  <a:srgbClr val="FF0000"/>
+                </a:solidFill>
+              </a:rPr>
+              <a:t>Passing tests </a:t>
+            </a:r>
+            <a:r>
+              <a:rPr lang="en-US" smtClean="0">
+                <a:solidFill>
+                  <a:srgbClr val="FF0000"/>
+                </a:solidFill>
+              </a:rPr>
+              <a:t>is important, so knowing when they fail is vital!</a:t>
+            </a:r>
+            <a:endParaRPr lang="en-US">
+              <a:solidFill>
+                <a:srgbClr val="FF0000"/>
+              </a:solidFill>
             </a:endParaRPr>
           </a:p>
         </p:txBody>
       </p:sp>
-      <p:sp>
-        <p:nvSpPr>
-          <p:cNvPr id="45059" name="Line 3"/>
-          <p:cNvSpPr>
-            <a:spLocks noChangeShapeType="1"/>
-          </p:cNvSpPr>
-          <p:nvPr/>
-        </p:nvSpPr>
-        <p:spPr bwMode="auto">
-          <a:xfrm>
-            <a:off x="457200" y="6172200"/>
-            <a:ext cx="8229600" cy="0"/>
-          </a:xfrm>
-          <a:prstGeom prst="line">
-            <a:avLst/>
-          </a:prstGeom>
-          <a:noFill/>
-          <a:ln w="25400" cap="flat" cmpd="sng">
-            <a:solidFill>
-              <a:srgbClr val="BFBFBF"/>
-            </a:solidFill>
-            <a:prstDash val="solid"/>
-            <a:round/>
-            <a:headEnd/>
-            <a:tailEnd/>
-          </a:ln>
-          <a:effectLst/>
-          <a:extLst>
-            <a:ext uri="{909E8E84-426E-40DD-AFC4-6F175D3DCCD1}">
-              <a14:hiddenFill xmlns:a14="http://schemas.microsoft.com/office/drawing/2010/main">
-                <a:noFill/>
-              </a14:hiddenFill>
-            </a:ext>
-            <a:ext uri="{AF507438-7753-43E0-B8FC-AC1667EBCBE1}">
-              <a14:hiddenEffects xmlns:a14="http://schemas.microsoft.com/office/drawing/2010/main">
-                <a:effectLst>
-                  <a:outerShdw blurRad="63500" dist="38099" dir="2700000" algn="ctr" rotWithShape="0">
-                    <a:srgbClr val="000000">
-                      <a:alpha val="74998"/>
-                    </a:srgbClr>
-                  </a:outerShdw>
-                </a:effectLst>
-              </a14:hiddenEffects>
-            </a:ext>
-          </a:extLst>
-        </p:spPr>
-        <p:txBody>
-          <a:bodyPr lIns="0" tIns="0" rIns="0" bIns="0"/>
-          <a:lstStyle/>
-          <a:p>
-            <a:endParaRPr lang="en-US" altLang="en-US" sz="1200">
-              <a:latin typeface="Helvetica" charset="0"/>
-              <a:ea typeface="Helvetica" charset="0"/>
-              <a:cs typeface="Helvetica" charset="0"/>
-              <a:sym typeface="Helvetica" charset="0"/>
-            </a:endParaRPr>
-          </a:p>
-        </p:txBody>
-      </p:sp>
-      <p:sp>
-        <p:nvSpPr>
-          <p:cNvPr id="45060" name="AutoShape 4"/>
-          <p:cNvSpPr>
-            <a:spLocks/>
-          </p:cNvSpPr>
-          <p:nvPr/>
-        </p:nvSpPr>
-        <p:spPr bwMode="auto">
-          <a:xfrm>
-            <a:off x="5688013" y="5106988"/>
-            <a:ext cx="2857500" cy="930275"/>
-          </a:xfrm>
-          <a:custGeom>
-            <a:avLst/>
-            <a:gdLst>
-              <a:gd name="T0" fmla="*/ 10800 w 21600"/>
-              <a:gd name="T1" fmla="*/ 10800 h 21600"/>
-              <a:gd name="T2" fmla="*/ 10800 w 21600"/>
-              <a:gd name="T3" fmla="*/ 10800 h 21600"/>
-              <a:gd name="T4" fmla="*/ 10800 w 21600"/>
-              <a:gd name="T5" fmla="*/ 10800 h 21600"/>
-              <a:gd name="T6" fmla="*/ 10800 w 21600"/>
-              <a:gd name="T7" fmla="*/ 10800 h 21600"/>
-            </a:gdLst>
-            <a:ahLst/>
-            <a:cxnLst>
-              <a:cxn ang="0">
-                <a:pos x="T0" y="T1"/>
-              </a:cxn>
-              <a:cxn ang="0">
-                <a:pos x="T2" y="T3"/>
-              </a:cxn>
-              <a:cxn ang="0">
-                <a:pos x="T4" y="T5"/>
-              </a:cxn>
-              <a:cxn ang="0">
-                <a:pos x="T6" y="T7"/>
-              </a:cxn>
-            </a:cxnLst>
-            <a:rect l="0" t="0" r="r" b="b"/>
-            <a:pathLst>
-              <a:path w="21600" h="21600">
-                <a:moveTo>
-                  <a:pt x="0" y="0"/>
-                </a:moveTo>
-                <a:lnTo>
-                  <a:pt x="21600" y="0"/>
-                </a:lnTo>
-                <a:lnTo>
-                  <a:pt x="21600" y="21600"/>
-                </a:lnTo>
-                <a:lnTo>
-                  <a:pt x="0" y="21600"/>
-                </a:lnTo>
-                <a:close/>
-              </a:path>
-            </a:pathLst>
-          </a:custGeom>
-          <a:noFill/>
-          <a:ln>
-            <a:noFill/>
-          </a:ln>
-          <a:effectLst/>
-          <a:extLst>
-            <a:ext uri="{909E8E84-426E-40DD-AFC4-6F175D3DCCD1}">
-              <a14:hiddenFill xmlns:a14="http://schemas.microsoft.com/office/drawing/2010/main">
-                <a:solidFill>
-                  <a:srgbClr val="FFFFFF"/>
-                </a:solidFill>
-              </a14:hiddenFill>
-            </a:ext>
-            <a:ext uri="{91240B29-F687-4F45-9708-019B960494DF}">
-              <a14:hiddenLine xmlns:a14="http://schemas.microsoft.com/office/drawing/2010/main" w="12700" cap="flat" cmpd="sng">
-                <a:solidFill>
-                  <a:srgbClr val="000000"/>
-                </a:solidFill>
-                <a:prstDash val="solid"/>
-                <a:miter lim="0"/>
-                <a:headEnd/>
-                <a:tailEnd/>
-              </a14:hiddenLine>
-            </a:ext>
-            <a:ext uri="{AF507438-7753-43E0-B8FC-AC1667EBCBE1}">
-              <a14:hiddenEffects xmlns:a14="http://schemas.microsoft.com/office/drawing/2010/main">
-                <a:effectLst>
-                  <a:outerShdw blurRad="63500" dist="38099" dir="2700000" algn="ctr" rotWithShape="0">
-                    <a:srgbClr val="000000">
-                      <a:alpha val="74998"/>
-                    </a:srgbClr>
-                  </a:outerShdw>
-                </a:effectLst>
-              </a14:hiddenEffects>
-            </a:ext>
-          </a:extLst>
-        </p:spPr>
-        <p:txBody>
-          <a:bodyPr lIns="45719" tIns="45719" rIns="45719" bIns="45719"/>
-          <a:lstStyle/>
-          <a:p>
-            <a:r>
-              <a:rPr lang="en-US" altLang="en-US" i="1">
-                <a:solidFill>
-                  <a:srgbClr val="7F7F7F"/>
-                </a:solidFill>
-              </a:rPr>
-              <a:t>* Taken from an actual email, sent daily with the test results.</a:t>
-            </a:r>
-            <a:endParaRPr lang="en-US" altLang="en-US"/>
-          </a:p>
-        </p:txBody>
-      </p:sp>
-      <p:sp>
-        <p:nvSpPr>
-          <p:cNvPr id="45061" name="AutoShape 5"/>
-          <p:cNvSpPr>
-            <a:spLocks/>
-          </p:cNvSpPr>
-          <p:nvPr/>
-        </p:nvSpPr>
-        <p:spPr bwMode="auto">
-          <a:xfrm>
-            <a:off x="5105400" y="685800"/>
-            <a:ext cx="3581400" cy="457200"/>
-          </a:xfrm>
-          <a:custGeom>
-            <a:avLst/>
-            <a:gdLst>
-              <a:gd name="T0" fmla="*/ 10800 w 21600"/>
-              <a:gd name="T1" fmla="*/ 10800 h 21600"/>
-              <a:gd name="T2" fmla="*/ 10800 w 21600"/>
-              <a:gd name="T3" fmla="*/ 10800 h 21600"/>
-              <a:gd name="T4" fmla="*/ 10800 w 21600"/>
-              <a:gd name="T5" fmla="*/ 10800 h 21600"/>
-              <a:gd name="T6" fmla="*/ 10800 w 21600"/>
-              <a:gd name="T7" fmla="*/ 10800 h 21600"/>
-            </a:gdLst>
-            <a:ahLst/>
-            <a:cxnLst>
-              <a:cxn ang="0">
-                <a:pos x="T0" y="T1"/>
-              </a:cxn>
-              <a:cxn ang="0">
-                <a:pos x="T2" y="T3"/>
-              </a:cxn>
-              <a:cxn ang="0">
-                <a:pos x="T4" y="T5"/>
-              </a:cxn>
-              <a:cxn ang="0">
-                <a:pos x="T6" y="T7"/>
-              </a:cxn>
-            </a:cxnLst>
-            <a:rect l="0" t="0" r="r" b="b"/>
-            <a:pathLst>
-              <a:path w="21600" h="21600">
-                <a:moveTo>
-                  <a:pt x="0" y="0"/>
-                </a:moveTo>
-                <a:lnTo>
-                  <a:pt x="21599" y="0"/>
-                </a:lnTo>
-                <a:lnTo>
-                  <a:pt x="21599" y="21600"/>
-                </a:lnTo>
-                <a:lnTo>
-                  <a:pt x="0" y="21600"/>
-                </a:lnTo>
-                <a:close/>
-              </a:path>
-            </a:pathLst>
-          </a:custGeom>
-          <a:solidFill>
-            <a:srgbClr val="BFBFBF"/>
-          </a:solidFill>
-          <a:ln>
-            <a:noFill/>
-          </a:ln>
-          <a:effectLst/>
-          <a:extLst>
-            <a:ext uri="{91240B29-F687-4F45-9708-019B960494DF}">
-              <a14:hiddenLine xmlns:a14="http://schemas.microsoft.com/office/drawing/2010/main" w="12700" cap="flat" cmpd="sng">
-                <a:solidFill>
-                  <a:srgbClr val="000000"/>
-                </a:solidFill>
-                <a:prstDash val="solid"/>
-                <a:miter lim="0"/>
-                <a:headEnd/>
-                <a:tailEnd/>
-              </a14:hiddenLine>
-            </a:ext>
-            <a:ext uri="{AF507438-7753-43E0-B8FC-AC1667EBCBE1}">
-              <a14:hiddenEffects xmlns:a14="http://schemas.microsoft.com/office/drawing/2010/main">
-                <a:effectLst>
-                  <a:outerShdw blurRad="63500" dist="38099" dir="2700000" algn="ctr" rotWithShape="0">
-                    <a:srgbClr val="000000">
-                      <a:alpha val="74998"/>
-                    </a:srgbClr>
-                  </a:outerShdw>
-                </a:effectLst>
-              </a14:hiddenEffects>
-            </a:ext>
-          </a:extLst>
-        </p:spPr>
-        <p:txBody>
-          <a:bodyPr lIns="0" tIns="0" rIns="0" bIns="0" anchor="ctr"/>
-          <a:lstStyle/>
-          <a:p>
-            <a:pPr algn="ctr"/>
-            <a:endParaRPr lang="en-US" altLang="en-US">
-              <a:solidFill>
-                <a:srgbClr val="FFFFFF"/>
-              </a:solidFill>
-            </a:endParaRPr>
-          </a:p>
-        </p:txBody>
-      </p:sp>
-      <p:sp>
-        <p:nvSpPr>
-          <p:cNvPr id="45062" name="AutoShape 6"/>
-          <p:cNvSpPr>
-            <a:spLocks/>
-          </p:cNvSpPr>
-          <p:nvPr/>
-        </p:nvSpPr>
-        <p:spPr bwMode="auto">
-          <a:xfrm>
-            <a:off x="5105400" y="788988"/>
-            <a:ext cx="3581400" cy="215900"/>
-          </a:xfrm>
-          <a:custGeom>
-            <a:avLst/>
-            <a:gdLst>
-              <a:gd name="T0" fmla="*/ 10800 w 21600"/>
-              <a:gd name="T1" fmla="*/ 10800 h 21600"/>
-              <a:gd name="T2" fmla="*/ 10800 w 21600"/>
-              <a:gd name="T3" fmla="*/ 10800 h 21600"/>
-              <a:gd name="T4" fmla="*/ 10800 w 21600"/>
-              <a:gd name="T5" fmla="*/ 10800 h 21600"/>
-              <a:gd name="T6" fmla="*/ 10800 w 21600"/>
-              <a:gd name="T7" fmla="*/ 10800 h 21600"/>
-            </a:gdLst>
-            <a:ahLst/>
-            <a:cxnLst>
-              <a:cxn ang="0">
-                <a:pos x="T0" y="T1"/>
-              </a:cxn>
-              <a:cxn ang="0">
-                <a:pos x="T2" y="T3"/>
-              </a:cxn>
-              <a:cxn ang="0">
-                <a:pos x="T4" y="T5"/>
-              </a:cxn>
-              <a:cxn ang="0">
-                <a:pos x="T6" y="T7"/>
-              </a:cxn>
-            </a:cxnLst>
-            <a:rect l="0" t="0" r="r" b="b"/>
-            <a:pathLst>
-              <a:path w="21600" h="21600">
-                <a:moveTo>
-                  <a:pt x="0" y="0"/>
-                </a:moveTo>
-                <a:lnTo>
-                  <a:pt x="21599" y="0"/>
-                </a:lnTo>
-                <a:lnTo>
-                  <a:pt x="21599" y="21600"/>
-                </a:lnTo>
-                <a:lnTo>
-                  <a:pt x="0" y="21600"/>
-                </a:lnTo>
-                <a:close/>
-              </a:path>
-            </a:pathLst>
-          </a:custGeom>
-          <a:noFill/>
-          <a:ln>
-            <a:noFill/>
-          </a:ln>
-          <a:effectLst/>
-          <a:extLst>
-            <a:ext uri="{909E8E84-426E-40DD-AFC4-6F175D3DCCD1}">
-              <a14:hiddenFill xmlns:a14="http://schemas.microsoft.com/office/drawing/2010/main">
-                <a:solidFill>
-                  <a:srgbClr val="FFFFFF"/>
-                </a:solidFill>
-              </a14:hiddenFill>
-            </a:ext>
-            <a:ext uri="{91240B29-F687-4F45-9708-019B960494DF}">
-              <a14:hiddenLine xmlns:a14="http://schemas.microsoft.com/office/drawing/2010/main" w="12700" cap="flat" cmpd="sng">
-                <a:solidFill>
-                  <a:srgbClr val="000000"/>
-                </a:solidFill>
-                <a:prstDash val="solid"/>
-                <a:miter lim="0"/>
-                <a:headEnd/>
-                <a:tailEnd/>
-              </a14:hiddenLine>
-            </a:ext>
-            <a:ext uri="{AF507438-7753-43E0-B8FC-AC1667EBCBE1}">
-              <a14:hiddenEffects xmlns:a14="http://schemas.microsoft.com/office/drawing/2010/main">
-                <a:effectLst>
-                  <a:outerShdw blurRad="63500" dist="38099" dir="2700000" algn="ctr" rotWithShape="0">
-                    <a:srgbClr val="000000">
-                      <a:alpha val="74998"/>
-                    </a:srgbClr>
-                  </a:outerShdw>
-                </a:effectLst>
-              </a14:hiddenEffects>
-            </a:ext>
-          </a:extLst>
-        </p:spPr>
-        <p:txBody>
-          <a:bodyPr lIns="0" tIns="0" rIns="0" bIns="0"/>
-          <a:lstStyle/>
-          <a:p>
-            <a:pPr algn="ctr"/>
-            <a:r>
-              <a:rPr lang="en-US" altLang="en-US" sz="1400">
-                <a:latin typeface="Verdana Bold" charset="0"/>
-                <a:ea typeface="Verdana Bold" charset="0"/>
-                <a:cs typeface="Verdana Bold" charset="0"/>
-                <a:sym typeface="Verdana Bold" charset="0"/>
-              </a:rPr>
-              <a:t>Applying the Rules – Passes Tests</a:t>
-            </a:r>
-            <a:endParaRPr lang="en-US" altLang="en-US"/>
-          </a:p>
-        </p:txBody>
-      </p:sp>
-      <p:pic>
-        <p:nvPicPr>
-          <p:cNvPr id="45063" name="Picture 7" descr="Screen Shot 2016-01-04 at 12.46.42 PM.png"/>
-          <p:cNvPicPr>
-            <a:picLocks noChangeAspect="1"/>
-          </p:cNvPicPr>
-          <p:nvPr/>
-        </p:nvPicPr>
-        <p:blipFill>
-          <a:blip r:embed="rId3">
-            <a:extLst>
-              <a:ext uri="{28A0092B-C50C-407E-A947-70E740481C1C}">
-                <a14:useLocalDpi xmlns:a14="http://schemas.microsoft.com/office/drawing/2010/main" val="0"/>
-              </a:ext>
-            </a:extLst>
-          </a:blip>
-          <a:srcRect/>
-          <a:stretch>
-            <a:fillRect/>
-          </a:stretch>
-        </p:blipFill>
-        <p:spPr bwMode="auto">
-          <a:xfrm>
-            <a:off x="647700" y="1247775"/>
-            <a:ext cx="5105400" cy="3754438"/>
-          </a:xfrm>
-          <a:prstGeom prst="rect">
-            <a:avLst/>
-          </a:prstGeom>
-          <a:noFill/>
-          <a:ln>
-            <a:noFill/>
-          </a:ln>
-          <a:effectLst/>
-          <a:extLst>
-            <a:ext uri="{909E8E84-426E-40DD-AFC4-6F175D3DCCD1}">
-              <a14:hiddenFill xmlns:a14="http://schemas.microsoft.com/office/drawing/2010/main">
-                <a:solidFill>
-                  <a:srgbClr val="FFFFFF"/>
-                </a:solidFill>
-              </a14:hiddenFill>
-            </a:ext>
-            <a:ext uri="{91240B29-F687-4F45-9708-019B960494DF}">
-              <a14:hiddenLine xmlns:a14="http://schemas.microsoft.com/office/drawing/2010/main" w="12700" cap="flat" cmpd="sng">
-                <a:solidFill>
-                  <a:srgbClr val="000000"/>
-                </a:solidFill>
-                <a:prstDash val="solid"/>
-                <a:miter lim="0"/>
-                <a:headEnd type="none" w="med" len="med"/>
-                <a:tailEnd type="none" w="med" len="med"/>
-              </a14:hiddenLine>
-            </a:ext>
-            <a:ext uri="{AF507438-7753-43E0-B8FC-AC1667EBCBE1}">
-              <a14:hiddenEffects xmlns:a14="http://schemas.microsoft.com/office/drawing/2010/main">
-                <a:effectLst>
-                  <a:outerShdw blurRad="63500" dist="38099" dir="2700000" algn="ctr" rotWithShape="0">
-                    <a:srgbClr val="000000">
-                      <a:alpha val="74998"/>
-                    </a:srgbClr>
-                  </a:outerShdw>
-                </a:effectLst>
-              </a14:hiddenEffects>
-            </a:ext>
-          </a:extLst>
-        </p:spPr>
-      </p:pic>
     </p:spTree>
+    <p:extLst>
+      <p:ext uri="{BB962C8B-B14F-4D97-AF65-F5344CB8AC3E}">
+        <p14:creationId xmlns:p14="http://schemas.microsoft.com/office/powerpoint/2010/main" val="2063579544"/>
+      </p:ext>
+    </p:extLst>
   </p:cSld>
   <p:clrMapOvr>
     <a:masterClrMapping/>
   </p:clrMapOvr>
-  <p:transition spd="slow">
-    <p:dissolve/>
-  </p:transition>
+  <mc:AlternateContent xmlns:mc="http://schemas.openxmlformats.org/markup-compatibility/2006" xmlns:p14="http://schemas.microsoft.com/office/powerpoint/2010/main">
+    <mc:Choice Requires="p14">
+      <p:transition spd="med" p14:dur="700">
+        <p:fade/>
+      </p:transition>
+    </mc:Choice>
+    <mc:Fallback xmlns="">
+      <p:transition spd="med">
+        <p:fade/>
+      </p:transition>
+    </mc:Fallback>
+  </mc:AlternateContent>
+  <p:timing>
+    <p:tnLst>
+      <p:par>
+        <p:cTn id="1" dur="indefinite" restart="never" nodeType="tmRoot"/>
+      </p:par>
+    </p:tnLst>
+  </p:timing>
 </p:sld>
 </file>
 
-<file path=ppt/slides/slide37.xml><?xml version="1.0" encoding="utf-8"?>
+<file path=ppt/slides/slide36.xml><?xml version="1.0" encoding="utf-8"?>
 <p:sld xmlns:a="http://schemas.openxmlformats.org/drawingml/2006/main" xmlns:r="http://schemas.openxmlformats.org/officeDocument/2006/relationships" xmlns:p="http://schemas.openxmlformats.org/presentationml/2006/main">
   <p:cSld>
     <p:spTree>
@@ -33926,7 +33469,7 @@
         <p:nvSpPr>
           <p:cNvPr id="46084" name="Rectangle 4"/>
           <p:cNvSpPr>
-            <a:spLocks noChangeArrowheads="1"/>
+            <a:spLocks noGrp="1" noChangeArrowheads="1"/>
           </p:cNvSpPr>
           <p:nvPr>
             <p:ph type="title"/>
@@ -34460,11 +34003,29 @@
   <p:clrMapOvr>
     <a:masterClrMapping/>
   </p:clrMapOvr>
-  <p:transition spd="med"/>
+  <mc:AlternateContent xmlns:mc="http://schemas.openxmlformats.org/markup-compatibility/2006" xmlns:p14="http://schemas.microsoft.com/office/powerpoint/2010/main">
+    <mc:Choice Requires="p14">
+      <p:transition spd="slow" p14:dur="1200">
+        <p:dissolve/>
+      </p:transition>
+    </mc:Choice>
+    <mc:Fallback xmlns="">
+      <p:transition spd="slow">
+        <p:dissolve/>
+      </p:transition>
+    </mc:Fallback>
+  </mc:AlternateContent>
+  <p:timing>
+    <p:tnLst>
+      <p:par>
+        <p:cTn id="1" dur="indefinite" restart="never" nodeType="tmRoot"/>
+      </p:par>
+    </p:tnLst>
+  </p:timing>
 </p:sld>
 </file>
 
-<file path=ppt/slides/slide38.xml><?xml version="1.0" encoding="utf-8"?>
+<file path=ppt/slides/slide37.xml><?xml version="1.0" encoding="utf-8"?>
 <p:sld xmlns:a="http://schemas.openxmlformats.org/drawingml/2006/main" xmlns:r="http://schemas.openxmlformats.org/officeDocument/2006/relationships" xmlns:p="http://schemas.openxmlformats.org/presentationml/2006/main">
   <p:cSld>
     <p:spTree>
@@ -34670,7 +34231,7 @@
         <p:nvSpPr>
           <p:cNvPr id="47108" name="Rectangle 4"/>
           <p:cNvSpPr>
-            <a:spLocks noChangeArrowheads="1"/>
+            <a:spLocks noGrp="1" noChangeArrowheads="1"/>
           </p:cNvSpPr>
           <p:nvPr>
             <p:ph type="title"/>
@@ -35039,13 +34600,29 @@
   <p:clrMapOvr>
     <a:masterClrMapping/>
   </p:clrMapOvr>
-  <p:transition spd="slow">
-    <p:dissolve/>
-  </p:transition>
+  <mc:AlternateContent xmlns:mc="http://schemas.openxmlformats.org/markup-compatibility/2006" xmlns:p14="http://schemas.microsoft.com/office/powerpoint/2010/main">
+    <mc:Choice Requires="p14">
+      <p:transition spd="slow" p14:dur="1200">
+        <p:dissolve/>
+      </p:transition>
+    </mc:Choice>
+    <mc:Fallback xmlns="">
+      <p:transition spd="slow">
+        <p:dissolve/>
+      </p:transition>
+    </mc:Fallback>
+  </mc:AlternateContent>
+  <p:timing>
+    <p:tnLst>
+      <p:par>
+        <p:cTn id="1" dur="indefinite" restart="never" nodeType="tmRoot"/>
+      </p:par>
+    </p:tnLst>
+  </p:timing>
 </p:sld>
 </file>
 
-<file path=ppt/slides/slide39.xml><?xml version="1.0" encoding="utf-8"?>
+<file path=ppt/slides/slide38.xml><?xml version="1.0" encoding="utf-8"?>
 <p:sld xmlns:a="http://schemas.openxmlformats.org/drawingml/2006/main" xmlns:r="http://schemas.openxmlformats.org/officeDocument/2006/relationships" xmlns:p="http://schemas.openxmlformats.org/presentationml/2006/main">
   <p:cSld>
     <p:spTree>
@@ -35540,6 +35117,516 @@
   <p:transition spd="slow">
     <p:dissolve/>
   </p:transition>
+  <p:timing>
+    <p:tnLst>
+      <p:par>
+        <p:cTn id="1" dur="indefinite" restart="never" nodeType="tmRoot"/>
+      </p:par>
+    </p:tnLst>
+  </p:timing>
+</p:sld>
+</file>
+
+<file path=ppt/slides/slide39.xml><?xml version="1.0" encoding="utf-8"?>
+<p:sld xmlns:a="http://schemas.openxmlformats.org/drawingml/2006/main" xmlns:r="http://schemas.openxmlformats.org/officeDocument/2006/relationships" xmlns:p="http://schemas.openxmlformats.org/presentationml/2006/main">
+  <p:cSld>
+    <p:spTree>
+      <p:nvGrpSpPr>
+        <p:cNvPr id="1" name=""/>
+        <p:cNvGrpSpPr/>
+        <p:nvPr/>
+      </p:nvGrpSpPr>
+      <p:grpSpPr>
+        <a:xfrm>
+          <a:off x="0" y="0"/>
+          <a:ext cx="0" cy="0"/>
+          <a:chOff x="0" y="0"/>
+          <a:chExt cx="0" cy="0"/>
+        </a:xfrm>
+      </p:grpSpPr>
+      <p:sp>
+        <p:nvSpPr>
+          <p:cNvPr id="49153" name="AutoShape 1"/>
+          <p:cNvSpPr>
+            <a:spLocks/>
+          </p:cNvSpPr>
+          <p:nvPr/>
+        </p:nvSpPr>
+        <p:spPr bwMode="auto">
+          <a:xfrm>
+            <a:off x="6324600" y="685800"/>
+            <a:ext cx="2362200" cy="457200"/>
+          </a:xfrm>
+          <a:custGeom>
+            <a:avLst/>
+            <a:gdLst>
+              <a:gd name="T0" fmla="*/ 10800 w 21600"/>
+              <a:gd name="T1" fmla="*/ 10800 h 21600"/>
+              <a:gd name="T2" fmla="*/ 10800 w 21600"/>
+              <a:gd name="T3" fmla="*/ 10800 h 21600"/>
+              <a:gd name="T4" fmla="*/ 10800 w 21600"/>
+              <a:gd name="T5" fmla="*/ 10800 h 21600"/>
+              <a:gd name="T6" fmla="*/ 10800 w 21600"/>
+              <a:gd name="T7" fmla="*/ 10800 h 21600"/>
+            </a:gdLst>
+            <a:ahLst/>
+            <a:cxnLst>
+              <a:cxn ang="0">
+                <a:pos x="T0" y="T1"/>
+              </a:cxn>
+              <a:cxn ang="0">
+                <a:pos x="T2" y="T3"/>
+              </a:cxn>
+              <a:cxn ang="0">
+                <a:pos x="T4" y="T5"/>
+              </a:cxn>
+              <a:cxn ang="0">
+                <a:pos x="T6" y="T7"/>
+              </a:cxn>
+            </a:cxnLst>
+            <a:rect l="0" t="0" r="r" b="b"/>
+            <a:pathLst>
+              <a:path w="21600" h="21600">
+                <a:moveTo>
+                  <a:pt x="0" y="0"/>
+                </a:moveTo>
+                <a:lnTo>
+                  <a:pt x="21599" y="0"/>
+                </a:lnTo>
+                <a:lnTo>
+                  <a:pt x="21599" y="21600"/>
+                </a:lnTo>
+                <a:lnTo>
+                  <a:pt x="0" y="21600"/>
+                </a:lnTo>
+                <a:close/>
+              </a:path>
+            </a:pathLst>
+          </a:custGeom>
+          <a:solidFill>
+            <a:srgbClr val="BFBFBF"/>
+          </a:solidFill>
+          <a:ln>
+            <a:noFill/>
+          </a:ln>
+          <a:effectLst/>
+          <a:extLst>
+            <a:ext uri="{91240B29-F687-4F45-9708-019B960494DF}">
+              <a14:hiddenLine xmlns:a14="http://schemas.microsoft.com/office/drawing/2010/main" w="12700" cap="flat" cmpd="sng">
+                <a:solidFill>
+                  <a:srgbClr val="000000"/>
+                </a:solidFill>
+                <a:prstDash val="solid"/>
+                <a:miter lim="0"/>
+                <a:headEnd/>
+                <a:tailEnd/>
+              </a14:hiddenLine>
+            </a:ext>
+            <a:ext uri="{AF507438-7753-43E0-B8FC-AC1667EBCBE1}">
+              <a14:hiddenEffects xmlns:a14="http://schemas.microsoft.com/office/drawing/2010/main">
+                <a:effectLst>
+                  <a:outerShdw blurRad="63500" dist="38099" dir="2700000" algn="ctr" rotWithShape="0">
+                    <a:srgbClr val="000000">
+                      <a:alpha val="74998"/>
+                    </a:srgbClr>
+                  </a:outerShdw>
+                </a:effectLst>
+              </a14:hiddenEffects>
+            </a:ext>
+          </a:extLst>
+        </p:spPr>
+        <p:txBody>
+          <a:bodyPr lIns="0" tIns="0" rIns="0" bIns="0" anchor="ctr"/>
+          <a:lstStyle/>
+          <a:p>
+            <a:pPr algn="ctr"/>
+            <a:endParaRPr lang="en-US" altLang="en-US">
+              <a:solidFill>
+                <a:srgbClr val="FFFFFF"/>
+              </a:solidFill>
+            </a:endParaRPr>
+          </a:p>
+        </p:txBody>
+      </p:sp>
+      <p:pic>
+        <p:nvPicPr>
+          <p:cNvPr id="49154" name="Picture 2" descr="CMM_Logo.eps"/>
+          <p:cNvPicPr>
+            <a:picLocks noChangeAspect="1"/>
+          </p:cNvPicPr>
+          <p:nvPr/>
+        </p:nvPicPr>
+        <p:blipFill>
+          <a:blip r:embed="rId2">
+            <a:extLst>
+              <a:ext uri="{28A0092B-C50C-407E-A947-70E740481C1C}">
+                <a14:useLocalDpi xmlns:a14="http://schemas.microsoft.com/office/drawing/2010/main" val="0"/>
+              </a:ext>
+            </a:extLst>
+          </a:blip>
+          <a:srcRect/>
+          <a:stretch>
+            <a:fillRect/>
+          </a:stretch>
+        </p:blipFill>
+        <p:spPr bwMode="auto">
+          <a:xfrm>
+            <a:off x="457200" y="457200"/>
+            <a:ext cx="2590800" cy="428625"/>
+          </a:xfrm>
+          <a:prstGeom prst="rect">
+            <a:avLst/>
+          </a:prstGeom>
+          <a:noFill/>
+          <a:ln>
+            <a:noFill/>
+          </a:ln>
+          <a:effectLst/>
+          <a:extLst>
+            <a:ext uri="{909E8E84-426E-40DD-AFC4-6F175D3DCCD1}">
+              <a14:hiddenFill xmlns:a14="http://schemas.microsoft.com/office/drawing/2010/main">
+                <a:solidFill>
+                  <a:srgbClr val="FFFFFF"/>
+                </a:solidFill>
+              </a14:hiddenFill>
+            </a:ext>
+            <a:ext uri="{91240B29-F687-4F45-9708-019B960494DF}">
+              <a14:hiddenLine xmlns:a14="http://schemas.microsoft.com/office/drawing/2010/main" w="12700" cap="flat" cmpd="sng">
+                <a:solidFill>
+                  <a:srgbClr val="000000"/>
+                </a:solidFill>
+                <a:prstDash val="solid"/>
+                <a:miter lim="0"/>
+                <a:headEnd type="none" w="med" len="med"/>
+                <a:tailEnd type="none" w="med" len="med"/>
+              </a14:hiddenLine>
+            </a:ext>
+            <a:ext uri="{AF507438-7753-43E0-B8FC-AC1667EBCBE1}">
+              <a14:hiddenEffects xmlns:a14="http://schemas.microsoft.com/office/drawing/2010/main">
+                <a:effectLst>
+                  <a:outerShdw blurRad="63500" dist="38099" dir="2700000" algn="ctr" rotWithShape="0">
+                    <a:srgbClr val="000000">
+                      <a:alpha val="74998"/>
+                    </a:srgbClr>
+                  </a:outerShdw>
+                </a:effectLst>
+              </a14:hiddenEffects>
+            </a:ext>
+          </a:extLst>
+        </p:spPr>
+      </p:pic>
+      <p:sp>
+        <p:nvSpPr>
+          <p:cNvPr id="49155" name="Line 3"/>
+          <p:cNvSpPr>
+            <a:spLocks noChangeShapeType="1"/>
+          </p:cNvSpPr>
+          <p:nvPr/>
+        </p:nvSpPr>
+        <p:spPr bwMode="auto">
+          <a:xfrm>
+            <a:off x="3124200" y="685800"/>
+            <a:ext cx="5562600" cy="0"/>
+          </a:xfrm>
+          <a:prstGeom prst="line">
+            <a:avLst/>
+          </a:prstGeom>
+          <a:noFill/>
+          <a:ln w="25400" cap="flat" cmpd="sng">
+            <a:solidFill>
+              <a:srgbClr val="BFBFBF"/>
+            </a:solidFill>
+            <a:prstDash val="solid"/>
+            <a:round/>
+            <a:headEnd/>
+            <a:tailEnd/>
+          </a:ln>
+          <a:effectLst/>
+          <a:extLst>
+            <a:ext uri="{909E8E84-426E-40DD-AFC4-6F175D3DCCD1}">
+              <a14:hiddenFill xmlns:a14="http://schemas.microsoft.com/office/drawing/2010/main">
+                <a:noFill/>
+              </a14:hiddenFill>
+            </a:ext>
+            <a:ext uri="{AF507438-7753-43E0-B8FC-AC1667EBCBE1}">
+              <a14:hiddenEffects xmlns:a14="http://schemas.microsoft.com/office/drawing/2010/main">
+                <a:effectLst>
+                  <a:outerShdw blurRad="63500" dist="38099" dir="2700000" algn="ctr" rotWithShape="0">
+                    <a:srgbClr val="000000">
+                      <a:alpha val="74998"/>
+                    </a:srgbClr>
+                  </a:outerShdw>
+                </a:effectLst>
+              </a14:hiddenEffects>
+            </a:ext>
+          </a:extLst>
+        </p:spPr>
+        <p:txBody>
+          <a:bodyPr lIns="0" tIns="0" rIns="0" bIns="0"/>
+          <a:lstStyle/>
+          <a:p>
+            <a:endParaRPr lang="en-US" altLang="en-US" sz="1200">
+              <a:latin typeface="Helvetica" charset="0"/>
+              <a:ea typeface="Helvetica" charset="0"/>
+              <a:cs typeface="Helvetica" charset="0"/>
+              <a:sym typeface="Helvetica" charset="0"/>
+            </a:endParaRPr>
+          </a:p>
+        </p:txBody>
+      </p:sp>
+      <p:sp>
+        <p:nvSpPr>
+          <p:cNvPr id="49156" name="AutoShape 4"/>
+          <p:cNvSpPr>
+            <a:spLocks/>
+          </p:cNvSpPr>
+          <p:nvPr/>
+        </p:nvSpPr>
+        <p:spPr bwMode="auto">
+          <a:xfrm>
+            <a:off x="6323013" y="788988"/>
+            <a:ext cx="2362200" cy="215900"/>
+          </a:xfrm>
+          <a:custGeom>
+            <a:avLst/>
+            <a:gdLst>
+              <a:gd name="T0" fmla="*/ 10800 w 21600"/>
+              <a:gd name="T1" fmla="*/ 10800 h 21600"/>
+              <a:gd name="T2" fmla="*/ 10800 w 21600"/>
+              <a:gd name="T3" fmla="*/ 10800 h 21600"/>
+              <a:gd name="T4" fmla="*/ 10800 w 21600"/>
+              <a:gd name="T5" fmla="*/ 10800 h 21600"/>
+              <a:gd name="T6" fmla="*/ 10800 w 21600"/>
+              <a:gd name="T7" fmla="*/ 10800 h 21600"/>
+            </a:gdLst>
+            <a:ahLst/>
+            <a:cxnLst>
+              <a:cxn ang="0">
+                <a:pos x="T0" y="T1"/>
+              </a:cxn>
+              <a:cxn ang="0">
+                <a:pos x="T2" y="T3"/>
+              </a:cxn>
+              <a:cxn ang="0">
+                <a:pos x="T4" y="T5"/>
+              </a:cxn>
+              <a:cxn ang="0">
+                <a:pos x="T6" y="T7"/>
+              </a:cxn>
+            </a:cxnLst>
+            <a:rect l="0" t="0" r="r" b="b"/>
+            <a:pathLst>
+              <a:path w="21600" h="21600">
+                <a:moveTo>
+                  <a:pt x="0" y="0"/>
+                </a:moveTo>
+                <a:lnTo>
+                  <a:pt x="21599" y="0"/>
+                </a:lnTo>
+                <a:lnTo>
+                  <a:pt x="21599" y="21600"/>
+                </a:lnTo>
+                <a:lnTo>
+                  <a:pt x="0" y="21600"/>
+                </a:lnTo>
+                <a:close/>
+              </a:path>
+            </a:pathLst>
+          </a:custGeom>
+          <a:noFill/>
+          <a:ln>
+            <a:noFill/>
+          </a:ln>
+          <a:effectLst/>
+          <a:extLst>
+            <a:ext uri="{909E8E84-426E-40DD-AFC4-6F175D3DCCD1}">
+              <a14:hiddenFill xmlns:a14="http://schemas.microsoft.com/office/drawing/2010/main">
+                <a:solidFill>
+                  <a:srgbClr val="FFFFFF"/>
+                </a:solidFill>
+              </a14:hiddenFill>
+            </a:ext>
+            <a:ext uri="{91240B29-F687-4F45-9708-019B960494DF}">
+              <a14:hiddenLine xmlns:a14="http://schemas.microsoft.com/office/drawing/2010/main" w="12700" cap="flat" cmpd="sng">
+                <a:solidFill>
+                  <a:srgbClr val="000000"/>
+                </a:solidFill>
+                <a:prstDash val="solid"/>
+                <a:miter lim="0"/>
+                <a:headEnd/>
+                <a:tailEnd/>
+              </a14:hiddenLine>
+            </a:ext>
+            <a:ext uri="{AF507438-7753-43E0-B8FC-AC1667EBCBE1}">
+              <a14:hiddenEffects xmlns:a14="http://schemas.microsoft.com/office/drawing/2010/main">
+                <a:effectLst>
+                  <a:outerShdw blurRad="63500" dist="38099" dir="2700000" algn="ctr" rotWithShape="0">
+                    <a:srgbClr val="000000">
+                      <a:alpha val="74998"/>
+                    </a:srgbClr>
+                  </a:outerShdw>
+                </a:effectLst>
+              </a14:hiddenEffects>
+            </a:ext>
+          </a:extLst>
+        </p:spPr>
+        <p:txBody>
+          <a:bodyPr lIns="0" tIns="0" rIns="0" bIns="0"/>
+          <a:lstStyle/>
+          <a:p>
+            <a:pPr algn="ctr"/>
+            <a:r>
+              <a:rPr lang="en-US" altLang="en-US" sz="1400">
+                <a:latin typeface="Verdana Bold" charset="0"/>
+                <a:ea typeface="Verdana Bold" charset="0"/>
+                <a:cs typeface="Verdana Bold" charset="0"/>
+                <a:sym typeface="Verdana Bold" charset="0"/>
+              </a:rPr>
+              <a:t>No Duplication (DRY)</a:t>
+            </a:r>
+            <a:endParaRPr lang="en-US" altLang="en-US"/>
+          </a:p>
+        </p:txBody>
+      </p:sp>
+      <p:sp>
+        <p:nvSpPr>
+          <p:cNvPr id="49157" name="Line 5"/>
+          <p:cNvSpPr>
+            <a:spLocks noChangeShapeType="1"/>
+          </p:cNvSpPr>
+          <p:nvPr/>
+        </p:nvSpPr>
+        <p:spPr bwMode="auto">
+          <a:xfrm>
+            <a:off x="457200" y="6172200"/>
+            <a:ext cx="8229600" cy="0"/>
+          </a:xfrm>
+          <a:prstGeom prst="line">
+            <a:avLst/>
+          </a:prstGeom>
+          <a:noFill/>
+          <a:ln w="25400" cap="flat" cmpd="sng">
+            <a:solidFill>
+              <a:srgbClr val="BFBFBF"/>
+            </a:solidFill>
+            <a:prstDash val="solid"/>
+            <a:round/>
+            <a:headEnd/>
+            <a:tailEnd/>
+          </a:ln>
+          <a:effectLst/>
+          <a:extLst>
+            <a:ext uri="{909E8E84-426E-40DD-AFC4-6F175D3DCCD1}">
+              <a14:hiddenFill xmlns:a14="http://schemas.microsoft.com/office/drawing/2010/main">
+                <a:noFill/>
+              </a14:hiddenFill>
+            </a:ext>
+            <a:ext uri="{AF507438-7753-43E0-B8FC-AC1667EBCBE1}">
+              <a14:hiddenEffects xmlns:a14="http://schemas.microsoft.com/office/drawing/2010/main">
+                <a:effectLst>
+                  <a:outerShdw blurRad="63500" dist="38099" dir="2700000" algn="ctr" rotWithShape="0">
+                    <a:srgbClr val="000000">
+                      <a:alpha val="74998"/>
+                    </a:srgbClr>
+                  </a:outerShdw>
+                </a:effectLst>
+              </a14:hiddenEffects>
+            </a:ext>
+          </a:extLst>
+        </p:spPr>
+        <p:txBody>
+          <a:bodyPr lIns="0" tIns="0" rIns="0" bIns="0"/>
+          <a:lstStyle/>
+          <a:p>
+            <a:endParaRPr lang="en-US" altLang="en-US" sz="1200">
+              <a:latin typeface="Helvetica" charset="0"/>
+              <a:ea typeface="Helvetica" charset="0"/>
+              <a:cs typeface="Helvetica" charset="0"/>
+              <a:sym typeface="Helvetica" charset="0"/>
+            </a:endParaRPr>
+          </a:p>
+        </p:txBody>
+      </p:sp>
+      <p:pic>
+        <p:nvPicPr>
+          <p:cNvPr id="49158" name="Picture 6" descr="image15.png"/>
+          <p:cNvPicPr>
+            <a:picLocks noChangeAspect="1"/>
+          </p:cNvPicPr>
+          <p:nvPr/>
+        </p:nvPicPr>
+        <p:blipFill>
+          <a:blip r:embed="rId3">
+            <a:extLst>
+              <a:ext uri="{28A0092B-C50C-407E-A947-70E740481C1C}">
+                <a14:useLocalDpi xmlns:a14="http://schemas.microsoft.com/office/drawing/2010/main" val="0"/>
+              </a:ext>
+            </a:extLst>
+          </a:blip>
+          <a:srcRect/>
+          <a:stretch>
+            <a:fillRect/>
+          </a:stretch>
+        </p:blipFill>
+        <p:spPr bwMode="auto">
+          <a:xfrm>
+            <a:off x="457200" y="1549400"/>
+            <a:ext cx="8229600" cy="3937000"/>
+          </a:xfrm>
+          <a:prstGeom prst="rect">
+            <a:avLst/>
+          </a:prstGeom>
+          <a:noFill/>
+          <a:ln>
+            <a:noFill/>
+          </a:ln>
+          <a:effectLst/>
+          <a:extLst>
+            <a:ext uri="{909E8E84-426E-40DD-AFC4-6F175D3DCCD1}">
+              <a14:hiddenFill xmlns:a14="http://schemas.microsoft.com/office/drawing/2010/main">
+                <a:solidFill>
+                  <a:srgbClr val="FFFFFF"/>
+                </a:solidFill>
+              </a14:hiddenFill>
+            </a:ext>
+            <a:ext uri="{91240B29-F687-4F45-9708-019B960494DF}">
+              <a14:hiddenLine xmlns:a14="http://schemas.microsoft.com/office/drawing/2010/main" w="12700" cap="flat" cmpd="sng">
+                <a:solidFill>
+                  <a:srgbClr val="000000"/>
+                </a:solidFill>
+                <a:prstDash val="solid"/>
+                <a:miter lim="0"/>
+                <a:headEnd type="none" w="med" len="med"/>
+                <a:tailEnd type="none" w="med" len="med"/>
+              </a14:hiddenLine>
+            </a:ext>
+            <a:ext uri="{AF507438-7753-43E0-B8FC-AC1667EBCBE1}">
+              <a14:hiddenEffects xmlns:a14="http://schemas.microsoft.com/office/drawing/2010/main">
+                <a:effectLst>
+                  <a:outerShdw blurRad="63500" dist="38099" dir="2700000" algn="ctr" rotWithShape="0">
+                    <a:srgbClr val="000000">
+                      <a:alpha val="74998"/>
+                    </a:srgbClr>
+                  </a:outerShdw>
+                </a:effectLst>
+              </a14:hiddenEffects>
+            </a:ext>
+          </a:extLst>
+        </p:spPr>
+      </p:pic>
+    </p:spTree>
+  </p:cSld>
+  <p:clrMapOvr>
+    <a:masterClrMapping/>
+  </p:clrMapOvr>
+  <p:transition spd="med"/>
+  <p:timing>
+    <p:tnLst>
+      <p:par>
+        <p:cTn id="1" dur="indefinite" restart="never" nodeType="tmRoot"/>
+      </p:par>
+    </p:tnLst>
+  </p:timing>
 </p:sld>
 </file>
 
@@ -35749,7 +35836,7 @@
         <p:nvSpPr>
           <p:cNvPr id="10244" name="Rectangle 4"/>
           <p:cNvSpPr>
-            <a:spLocks noChangeArrowheads="1"/>
+            <a:spLocks noGrp="1" noChangeArrowheads="1"/>
           </p:cNvSpPr>
           <p:nvPr>
             <p:ph type="title"/>
@@ -36167,506 +36254,17 @@
     <a:masterClrMapping/>
   </p:clrMapOvr>
   <p:transition spd="med"/>
+  <p:timing>
+    <p:tnLst>
+      <p:par>
+        <p:cTn id="1" dur="indefinite" restart="never" nodeType="tmRoot"/>
+      </p:par>
+    </p:tnLst>
+  </p:timing>
 </p:sld>
 </file>
 
 <file path=ppt/slides/slide40.xml><?xml version="1.0" encoding="utf-8"?>
-<p:sld xmlns:a="http://schemas.openxmlformats.org/drawingml/2006/main" xmlns:r="http://schemas.openxmlformats.org/officeDocument/2006/relationships" xmlns:p="http://schemas.openxmlformats.org/presentationml/2006/main">
-  <p:cSld>
-    <p:spTree>
-      <p:nvGrpSpPr>
-        <p:cNvPr id="1" name=""/>
-        <p:cNvGrpSpPr/>
-        <p:nvPr/>
-      </p:nvGrpSpPr>
-      <p:grpSpPr>
-        <a:xfrm>
-          <a:off x="0" y="0"/>
-          <a:ext cx="0" cy="0"/>
-          <a:chOff x="0" y="0"/>
-          <a:chExt cx="0" cy="0"/>
-        </a:xfrm>
-      </p:grpSpPr>
-      <p:sp>
-        <p:nvSpPr>
-          <p:cNvPr id="49153" name="AutoShape 1"/>
-          <p:cNvSpPr>
-            <a:spLocks/>
-          </p:cNvSpPr>
-          <p:nvPr/>
-        </p:nvSpPr>
-        <p:spPr bwMode="auto">
-          <a:xfrm>
-            <a:off x="6324600" y="685800"/>
-            <a:ext cx="2362200" cy="457200"/>
-          </a:xfrm>
-          <a:custGeom>
-            <a:avLst/>
-            <a:gdLst>
-              <a:gd name="T0" fmla="*/ 10800 w 21600"/>
-              <a:gd name="T1" fmla="*/ 10800 h 21600"/>
-              <a:gd name="T2" fmla="*/ 10800 w 21600"/>
-              <a:gd name="T3" fmla="*/ 10800 h 21600"/>
-              <a:gd name="T4" fmla="*/ 10800 w 21600"/>
-              <a:gd name="T5" fmla="*/ 10800 h 21600"/>
-              <a:gd name="T6" fmla="*/ 10800 w 21600"/>
-              <a:gd name="T7" fmla="*/ 10800 h 21600"/>
-            </a:gdLst>
-            <a:ahLst/>
-            <a:cxnLst>
-              <a:cxn ang="0">
-                <a:pos x="T0" y="T1"/>
-              </a:cxn>
-              <a:cxn ang="0">
-                <a:pos x="T2" y="T3"/>
-              </a:cxn>
-              <a:cxn ang="0">
-                <a:pos x="T4" y="T5"/>
-              </a:cxn>
-              <a:cxn ang="0">
-                <a:pos x="T6" y="T7"/>
-              </a:cxn>
-            </a:cxnLst>
-            <a:rect l="0" t="0" r="r" b="b"/>
-            <a:pathLst>
-              <a:path w="21600" h="21600">
-                <a:moveTo>
-                  <a:pt x="0" y="0"/>
-                </a:moveTo>
-                <a:lnTo>
-                  <a:pt x="21599" y="0"/>
-                </a:lnTo>
-                <a:lnTo>
-                  <a:pt x="21599" y="21600"/>
-                </a:lnTo>
-                <a:lnTo>
-                  <a:pt x="0" y="21600"/>
-                </a:lnTo>
-                <a:close/>
-              </a:path>
-            </a:pathLst>
-          </a:custGeom>
-          <a:solidFill>
-            <a:srgbClr val="BFBFBF"/>
-          </a:solidFill>
-          <a:ln>
-            <a:noFill/>
-          </a:ln>
-          <a:effectLst/>
-          <a:extLst>
-            <a:ext uri="{91240B29-F687-4F45-9708-019B960494DF}">
-              <a14:hiddenLine xmlns:a14="http://schemas.microsoft.com/office/drawing/2010/main" w="12700" cap="flat" cmpd="sng">
-                <a:solidFill>
-                  <a:srgbClr val="000000"/>
-                </a:solidFill>
-                <a:prstDash val="solid"/>
-                <a:miter lim="0"/>
-                <a:headEnd/>
-                <a:tailEnd/>
-              </a14:hiddenLine>
-            </a:ext>
-            <a:ext uri="{AF507438-7753-43E0-B8FC-AC1667EBCBE1}">
-              <a14:hiddenEffects xmlns:a14="http://schemas.microsoft.com/office/drawing/2010/main">
-                <a:effectLst>
-                  <a:outerShdw blurRad="63500" dist="38099" dir="2700000" algn="ctr" rotWithShape="0">
-                    <a:srgbClr val="000000">
-                      <a:alpha val="74998"/>
-                    </a:srgbClr>
-                  </a:outerShdw>
-                </a:effectLst>
-              </a14:hiddenEffects>
-            </a:ext>
-          </a:extLst>
-        </p:spPr>
-        <p:txBody>
-          <a:bodyPr lIns="0" tIns="0" rIns="0" bIns="0" anchor="ctr"/>
-          <a:lstStyle/>
-          <a:p>
-            <a:pPr algn="ctr"/>
-            <a:endParaRPr lang="en-US" altLang="en-US">
-              <a:solidFill>
-                <a:srgbClr val="FFFFFF"/>
-              </a:solidFill>
-            </a:endParaRPr>
-          </a:p>
-        </p:txBody>
-      </p:sp>
-      <p:pic>
-        <p:nvPicPr>
-          <p:cNvPr id="49154" name="Picture 2" descr="CMM_Logo.eps"/>
-          <p:cNvPicPr>
-            <a:picLocks noChangeAspect="1"/>
-          </p:cNvPicPr>
-          <p:nvPr/>
-        </p:nvPicPr>
-        <p:blipFill>
-          <a:blip r:embed="rId2">
-            <a:extLst>
-              <a:ext uri="{28A0092B-C50C-407E-A947-70E740481C1C}">
-                <a14:useLocalDpi xmlns:a14="http://schemas.microsoft.com/office/drawing/2010/main" val="0"/>
-              </a:ext>
-            </a:extLst>
-          </a:blip>
-          <a:srcRect/>
-          <a:stretch>
-            <a:fillRect/>
-          </a:stretch>
-        </p:blipFill>
-        <p:spPr bwMode="auto">
-          <a:xfrm>
-            <a:off x="457200" y="457200"/>
-            <a:ext cx="2590800" cy="428625"/>
-          </a:xfrm>
-          <a:prstGeom prst="rect">
-            <a:avLst/>
-          </a:prstGeom>
-          <a:noFill/>
-          <a:ln>
-            <a:noFill/>
-          </a:ln>
-          <a:effectLst/>
-          <a:extLst>
-            <a:ext uri="{909E8E84-426E-40DD-AFC4-6F175D3DCCD1}">
-              <a14:hiddenFill xmlns:a14="http://schemas.microsoft.com/office/drawing/2010/main">
-                <a:solidFill>
-                  <a:srgbClr val="FFFFFF"/>
-                </a:solidFill>
-              </a14:hiddenFill>
-            </a:ext>
-            <a:ext uri="{91240B29-F687-4F45-9708-019B960494DF}">
-              <a14:hiddenLine xmlns:a14="http://schemas.microsoft.com/office/drawing/2010/main" w="12700" cap="flat" cmpd="sng">
-                <a:solidFill>
-                  <a:srgbClr val="000000"/>
-                </a:solidFill>
-                <a:prstDash val="solid"/>
-                <a:miter lim="0"/>
-                <a:headEnd type="none" w="med" len="med"/>
-                <a:tailEnd type="none" w="med" len="med"/>
-              </a14:hiddenLine>
-            </a:ext>
-            <a:ext uri="{AF507438-7753-43E0-B8FC-AC1667EBCBE1}">
-              <a14:hiddenEffects xmlns:a14="http://schemas.microsoft.com/office/drawing/2010/main">
-                <a:effectLst>
-                  <a:outerShdw blurRad="63500" dist="38099" dir="2700000" algn="ctr" rotWithShape="0">
-                    <a:srgbClr val="000000">
-                      <a:alpha val="74998"/>
-                    </a:srgbClr>
-                  </a:outerShdw>
-                </a:effectLst>
-              </a14:hiddenEffects>
-            </a:ext>
-          </a:extLst>
-        </p:spPr>
-      </p:pic>
-      <p:sp>
-        <p:nvSpPr>
-          <p:cNvPr id="49155" name="Line 3"/>
-          <p:cNvSpPr>
-            <a:spLocks noChangeShapeType="1"/>
-          </p:cNvSpPr>
-          <p:nvPr/>
-        </p:nvSpPr>
-        <p:spPr bwMode="auto">
-          <a:xfrm>
-            <a:off x="3124200" y="685800"/>
-            <a:ext cx="5562600" cy="0"/>
-          </a:xfrm>
-          <a:prstGeom prst="line">
-            <a:avLst/>
-          </a:prstGeom>
-          <a:noFill/>
-          <a:ln w="25400" cap="flat" cmpd="sng">
-            <a:solidFill>
-              <a:srgbClr val="BFBFBF"/>
-            </a:solidFill>
-            <a:prstDash val="solid"/>
-            <a:round/>
-            <a:headEnd/>
-            <a:tailEnd/>
-          </a:ln>
-          <a:effectLst/>
-          <a:extLst>
-            <a:ext uri="{909E8E84-426E-40DD-AFC4-6F175D3DCCD1}">
-              <a14:hiddenFill xmlns:a14="http://schemas.microsoft.com/office/drawing/2010/main">
-                <a:noFill/>
-              </a14:hiddenFill>
-            </a:ext>
-            <a:ext uri="{AF507438-7753-43E0-B8FC-AC1667EBCBE1}">
-              <a14:hiddenEffects xmlns:a14="http://schemas.microsoft.com/office/drawing/2010/main">
-                <a:effectLst>
-                  <a:outerShdw blurRad="63500" dist="38099" dir="2700000" algn="ctr" rotWithShape="0">
-                    <a:srgbClr val="000000">
-                      <a:alpha val="74998"/>
-                    </a:srgbClr>
-                  </a:outerShdw>
-                </a:effectLst>
-              </a14:hiddenEffects>
-            </a:ext>
-          </a:extLst>
-        </p:spPr>
-        <p:txBody>
-          <a:bodyPr lIns="0" tIns="0" rIns="0" bIns="0"/>
-          <a:lstStyle/>
-          <a:p>
-            <a:endParaRPr lang="en-US" altLang="en-US" sz="1200">
-              <a:latin typeface="Helvetica" charset="0"/>
-              <a:ea typeface="Helvetica" charset="0"/>
-              <a:cs typeface="Helvetica" charset="0"/>
-              <a:sym typeface="Helvetica" charset="0"/>
-            </a:endParaRPr>
-          </a:p>
-        </p:txBody>
-      </p:sp>
-      <p:sp>
-        <p:nvSpPr>
-          <p:cNvPr id="49156" name="AutoShape 4"/>
-          <p:cNvSpPr>
-            <a:spLocks/>
-          </p:cNvSpPr>
-          <p:nvPr/>
-        </p:nvSpPr>
-        <p:spPr bwMode="auto">
-          <a:xfrm>
-            <a:off x="6323013" y="788988"/>
-            <a:ext cx="2362200" cy="215900"/>
-          </a:xfrm>
-          <a:custGeom>
-            <a:avLst/>
-            <a:gdLst>
-              <a:gd name="T0" fmla="*/ 10800 w 21600"/>
-              <a:gd name="T1" fmla="*/ 10800 h 21600"/>
-              <a:gd name="T2" fmla="*/ 10800 w 21600"/>
-              <a:gd name="T3" fmla="*/ 10800 h 21600"/>
-              <a:gd name="T4" fmla="*/ 10800 w 21600"/>
-              <a:gd name="T5" fmla="*/ 10800 h 21600"/>
-              <a:gd name="T6" fmla="*/ 10800 w 21600"/>
-              <a:gd name="T7" fmla="*/ 10800 h 21600"/>
-            </a:gdLst>
-            <a:ahLst/>
-            <a:cxnLst>
-              <a:cxn ang="0">
-                <a:pos x="T0" y="T1"/>
-              </a:cxn>
-              <a:cxn ang="0">
-                <a:pos x="T2" y="T3"/>
-              </a:cxn>
-              <a:cxn ang="0">
-                <a:pos x="T4" y="T5"/>
-              </a:cxn>
-              <a:cxn ang="0">
-                <a:pos x="T6" y="T7"/>
-              </a:cxn>
-            </a:cxnLst>
-            <a:rect l="0" t="0" r="r" b="b"/>
-            <a:pathLst>
-              <a:path w="21600" h="21600">
-                <a:moveTo>
-                  <a:pt x="0" y="0"/>
-                </a:moveTo>
-                <a:lnTo>
-                  <a:pt x="21599" y="0"/>
-                </a:lnTo>
-                <a:lnTo>
-                  <a:pt x="21599" y="21600"/>
-                </a:lnTo>
-                <a:lnTo>
-                  <a:pt x="0" y="21600"/>
-                </a:lnTo>
-                <a:close/>
-              </a:path>
-            </a:pathLst>
-          </a:custGeom>
-          <a:noFill/>
-          <a:ln>
-            <a:noFill/>
-          </a:ln>
-          <a:effectLst/>
-          <a:extLst>
-            <a:ext uri="{909E8E84-426E-40DD-AFC4-6F175D3DCCD1}">
-              <a14:hiddenFill xmlns:a14="http://schemas.microsoft.com/office/drawing/2010/main">
-                <a:solidFill>
-                  <a:srgbClr val="FFFFFF"/>
-                </a:solidFill>
-              </a14:hiddenFill>
-            </a:ext>
-            <a:ext uri="{91240B29-F687-4F45-9708-019B960494DF}">
-              <a14:hiddenLine xmlns:a14="http://schemas.microsoft.com/office/drawing/2010/main" w="12700" cap="flat" cmpd="sng">
-                <a:solidFill>
-                  <a:srgbClr val="000000"/>
-                </a:solidFill>
-                <a:prstDash val="solid"/>
-                <a:miter lim="0"/>
-                <a:headEnd/>
-                <a:tailEnd/>
-              </a14:hiddenLine>
-            </a:ext>
-            <a:ext uri="{AF507438-7753-43E0-B8FC-AC1667EBCBE1}">
-              <a14:hiddenEffects xmlns:a14="http://schemas.microsoft.com/office/drawing/2010/main">
-                <a:effectLst>
-                  <a:outerShdw blurRad="63500" dist="38099" dir="2700000" algn="ctr" rotWithShape="0">
-                    <a:srgbClr val="000000">
-                      <a:alpha val="74998"/>
-                    </a:srgbClr>
-                  </a:outerShdw>
-                </a:effectLst>
-              </a14:hiddenEffects>
-            </a:ext>
-          </a:extLst>
-        </p:spPr>
-        <p:txBody>
-          <a:bodyPr lIns="0" tIns="0" rIns="0" bIns="0"/>
-          <a:lstStyle/>
-          <a:p>
-            <a:pPr algn="ctr"/>
-            <a:r>
-              <a:rPr lang="en-US" altLang="en-US" sz="1400">
-                <a:latin typeface="Verdana Bold" charset="0"/>
-                <a:ea typeface="Verdana Bold" charset="0"/>
-                <a:cs typeface="Verdana Bold" charset="0"/>
-                <a:sym typeface="Verdana Bold" charset="0"/>
-              </a:rPr>
-              <a:t>No Duplication (DRY)</a:t>
-            </a:r>
-            <a:endParaRPr lang="en-US" altLang="en-US"/>
-          </a:p>
-        </p:txBody>
-      </p:sp>
-      <p:sp>
-        <p:nvSpPr>
-          <p:cNvPr id="49157" name="Line 5"/>
-          <p:cNvSpPr>
-            <a:spLocks noChangeShapeType="1"/>
-          </p:cNvSpPr>
-          <p:nvPr/>
-        </p:nvSpPr>
-        <p:spPr bwMode="auto">
-          <a:xfrm>
-            <a:off x="457200" y="6172200"/>
-            <a:ext cx="8229600" cy="0"/>
-          </a:xfrm>
-          <a:prstGeom prst="line">
-            <a:avLst/>
-          </a:prstGeom>
-          <a:noFill/>
-          <a:ln w="25400" cap="flat" cmpd="sng">
-            <a:solidFill>
-              <a:srgbClr val="BFBFBF"/>
-            </a:solidFill>
-            <a:prstDash val="solid"/>
-            <a:round/>
-            <a:headEnd/>
-            <a:tailEnd/>
-          </a:ln>
-          <a:effectLst/>
-          <a:extLst>
-            <a:ext uri="{909E8E84-426E-40DD-AFC4-6F175D3DCCD1}">
-              <a14:hiddenFill xmlns:a14="http://schemas.microsoft.com/office/drawing/2010/main">
-                <a:noFill/>
-              </a14:hiddenFill>
-            </a:ext>
-            <a:ext uri="{AF507438-7753-43E0-B8FC-AC1667EBCBE1}">
-              <a14:hiddenEffects xmlns:a14="http://schemas.microsoft.com/office/drawing/2010/main">
-                <a:effectLst>
-                  <a:outerShdw blurRad="63500" dist="38099" dir="2700000" algn="ctr" rotWithShape="0">
-                    <a:srgbClr val="000000">
-                      <a:alpha val="74998"/>
-                    </a:srgbClr>
-                  </a:outerShdw>
-                </a:effectLst>
-              </a14:hiddenEffects>
-            </a:ext>
-          </a:extLst>
-        </p:spPr>
-        <p:txBody>
-          <a:bodyPr lIns="0" tIns="0" rIns="0" bIns="0"/>
-          <a:lstStyle/>
-          <a:p>
-            <a:endParaRPr lang="en-US" altLang="en-US" sz="1200">
-              <a:latin typeface="Helvetica" charset="0"/>
-              <a:ea typeface="Helvetica" charset="0"/>
-              <a:cs typeface="Helvetica" charset="0"/>
-              <a:sym typeface="Helvetica" charset="0"/>
-            </a:endParaRPr>
-          </a:p>
-        </p:txBody>
-      </p:sp>
-      <p:pic>
-        <p:nvPicPr>
-          <p:cNvPr id="49158" name="Picture 6" descr="image15.png"/>
-          <p:cNvPicPr>
-            <a:picLocks noChangeAspect="1"/>
-          </p:cNvPicPr>
-          <p:nvPr/>
-        </p:nvPicPr>
-        <p:blipFill>
-          <a:blip r:embed="rId3">
-            <a:extLst>
-              <a:ext uri="{28A0092B-C50C-407E-A947-70E740481C1C}">
-                <a14:useLocalDpi xmlns:a14="http://schemas.microsoft.com/office/drawing/2010/main" val="0"/>
-              </a:ext>
-            </a:extLst>
-          </a:blip>
-          <a:srcRect/>
-          <a:stretch>
-            <a:fillRect/>
-          </a:stretch>
-        </p:blipFill>
-        <p:spPr bwMode="auto">
-          <a:xfrm>
-            <a:off x="457200" y="1549400"/>
-            <a:ext cx="8229600" cy="3937000"/>
-          </a:xfrm>
-          <a:prstGeom prst="rect">
-            <a:avLst/>
-          </a:prstGeom>
-          <a:noFill/>
-          <a:ln>
-            <a:noFill/>
-          </a:ln>
-          <a:effectLst/>
-          <a:extLst>
-            <a:ext uri="{909E8E84-426E-40DD-AFC4-6F175D3DCCD1}">
-              <a14:hiddenFill xmlns:a14="http://schemas.microsoft.com/office/drawing/2010/main">
-                <a:solidFill>
-                  <a:srgbClr val="FFFFFF"/>
-                </a:solidFill>
-              </a14:hiddenFill>
-            </a:ext>
-            <a:ext uri="{91240B29-F687-4F45-9708-019B960494DF}">
-              <a14:hiddenLine xmlns:a14="http://schemas.microsoft.com/office/drawing/2010/main" w="12700" cap="flat" cmpd="sng">
-                <a:solidFill>
-                  <a:srgbClr val="000000"/>
-                </a:solidFill>
-                <a:prstDash val="solid"/>
-                <a:miter lim="0"/>
-                <a:headEnd type="none" w="med" len="med"/>
-                <a:tailEnd type="none" w="med" len="med"/>
-              </a14:hiddenLine>
-            </a:ext>
-            <a:ext uri="{AF507438-7753-43E0-B8FC-AC1667EBCBE1}">
-              <a14:hiddenEffects xmlns:a14="http://schemas.microsoft.com/office/drawing/2010/main">
-                <a:effectLst>
-                  <a:outerShdw blurRad="63500" dist="38099" dir="2700000" algn="ctr" rotWithShape="0">
-                    <a:srgbClr val="000000">
-                      <a:alpha val="74998"/>
-                    </a:srgbClr>
-                  </a:outerShdw>
-                </a:effectLst>
-              </a14:hiddenEffects>
-            </a:ext>
-          </a:extLst>
-        </p:spPr>
-      </p:pic>
-    </p:spTree>
-  </p:cSld>
-  <p:clrMapOvr>
-    <a:masterClrMapping/>
-  </p:clrMapOvr>
-  <p:transition spd="med"/>
-</p:sld>
-</file>
-
-<file path=ppt/slides/slide41.xml><?xml version="1.0" encoding="utf-8"?>
 <p:sld xmlns:a="http://schemas.openxmlformats.org/drawingml/2006/main" xmlns:r="http://schemas.openxmlformats.org/officeDocument/2006/relationships" xmlns:p="http://schemas.openxmlformats.org/presentationml/2006/main">
   <p:cSld>
     <p:spTree>
@@ -37159,10 +36757,17 @@
     <a:masterClrMapping/>
   </p:clrMapOvr>
   <p:transition spd="med"/>
+  <p:timing>
+    <p:tnLst>
+      <p:par>
+        <p:cTn id="1" dur="indefinite" restart="never" nodeType="tmRoot"/>
+      </p:par>
+    </p:tnLst>
+  </p:timing>
 </p:sld>
 </file>
 
-<file path=ppt/slides/slide42.xml><?xml version="1.0" encoding="utf-8"?>
+<file path=ppt/slides/slide41.xml><?xml version="1.0" encoding="utf-8"?>
 <p:sld xmlns:a="http://schemas.openxmlformats.org/drawingml/2006/main" xmlns:r="http://schemas.openxmlformats.org/officeDocument/2006/relationships" xmlns:p="http://schemas.openxmlformats.org/presentationml/2006/main">
   <p:cSld>
     <p:spTree>
@@ -37183,7 +36788,7 @@
         <p:nvSpPr>
           <p:cNvPr id="51201" name="Rectangle 1"/>
           <p:cNvSpPr>
-            <a:spLocks noChangeArrowheads="1"/>
+            <a:spLocks noGrp="1" noChangeArrowheads="1"/>
           </p:cNvSpPr>
           <p:nvPr>
             <p:ph type="title"/>
@@ -37586,10 +37191,17 @@
     <a:masterClrMapping/>
   </p:clrMapOvr>
   <p:transition spd="med"/>
+  <p:timing>
+    <p:tnLst>
+      <p:par>
+        <p:cTn id="1" dur="indefinite" restart="never" nodeType="tmRoot"/>
+      </p:par>
+    </p:tnLst>
+  </p:timing>
 </p:sld>
 </file>
 
-<file path=ppt/slides/slide43.xml><?xml version="1.0" encoding="utf-8"?>
+<file path=ppt/slides/slide42.xml><?xml version="1.0" encoding="utf-8"?>
 <p:sld xmlns:a="http://schemas.openxmlformats.org/drawingml/2006/main" xmlns:r="http://schemas.openxmlformats.org/officeDocument/2006/relationships" xmlns:p="http://schemas.openxmlformats.org/presentationml/2006/main">
   <p:cSld>
     <p:spTree>
@@ -37610,7 +37222,7 @@
         <p:nvSpPr>
           <p:cNvPr id="52225" name="Rectangle 1"/>
           <p:cNvSpPr>
-            <a:spLocks noChangeArrowheads="1"/>
+            <a:spLocks noGrp="1" noChangeArrowheads="1"/>
           </p:cNvSpPr>
           <p:nvPr>
             <p:ph type="title"/>
@@ -38018,10 +37630,17 @@
     <a:masterClrMapping/>
   </p:clrMapOvr>
   <p:transition spd="med"/>
+  <p:timing>
+    <p:tnLst>
+      <p:par>
+        <p:cTn id="1" dur="indefinite" restart="never" nodeType="tmRoot"/>
+      </p:par>
+    </p:tnLst>
+  </p:timing>
 </p:sld>
 </file>
 
-<file path=ppt/slides/slide44.xml><?xml version="1.0" encoding="utf-8"?>
+<file path=ppt/slides/slide43.xml><?xml version="1.0" encoding="utf-8"?>
 <p:sld xmlns:a="http://schemas.openxmlformats.org/drawingml/2006/main" xmlns:r="http://schemas.openxmlformats.org/officeDocument/2006/relationships" xmlns:p="http://schemas.openxmlformats.org/presentationml/2006/main">
   <p:cSld>
     <p:spTree>
@@ -40316,10 +39935,17 @@
     <a:masterClrMapping/>
   </p:clrMapOvr>
   <p:transition spd="med"/>
+  <p:timing>
+    <p:tnLst>
+      <p:par>
+        <p:cTn id="1" dur="indefinite" restart="never" nodeType="tmRoot"/>
+      </p:par>
+    </p:tnLst>
+  </p:timing>
 </p:sld>
 </file>
 
-<file path=ppt/slides/slide45.xml><?xml version="1.0" encoding="utf-8"?>
+<file path=ppt/slides/slide44.xml><?xml version="1.0" encoding="utf-8"?>
 <p:sld xmlns:a="http://schemas.openxmlformats.org/drawingml/2006/main" xmlns:r="http://schemas.openxmlformats.org/officeDocument/2006/relationships" xmlns:p="http://schemas.openxmlformats.org/presentationml/2006/main">
   <p:cSld>
     <p:spTree>
@@ -41219,10 +40845,17 @@
     <a:masterClrMapping/>
   </p:clrMapOvr>
   <p:transition spd="med"/>
+  <p:timing>
+    <p:tnLst>
+      <p:par>
+        <p:cTn id="1" dur="indefinite" restart="never" nodeType="tmRoot"/>
+      </p:par>
+    </p:tnLst>
+  </p:timing>
 </p:sld>
 </file>
 
-<file path=ppt/slides/slide46.xml><?xml version="1.0" encoding="utf-8"?>
+<file path=ppt/slides/slide45.xml><?xml version="1.0" encoding="utf-8"?>
 <p:sld xmlns:a="http://schemas.openxmlformats.org/drawingml/2006/main" xmlns:r="http://schemas.openxmlformats.org/officeDocument/2006/relationships" xmlns:p="http://schemas.openxmlformats.org/presentationml/2006/main">
   <p:cSld>
     <p:spTree>
@@ -41715,10 +41348,17 @@
     <a:masterClrMapping/>
   </p:clrMapOvr>
   <p:transition spd="med"/>
+  <p:timing>
+    <p:tnLst>
+      <p:par>
+        <p:cTn id="1" dur="indefinite" restart="never" nodeType="tmRoot"/>
+      </p:par>
+    </p:tnLst>
+  </p:timing>
 </p:sld>
 </file>
 
-<file path=ppt/slides/slide47.xml><?xml version="1.0" encoding="utf-8"?>
+<file path=ppt/slides/slide46.xml><?xml version="1.0" encoding="utf-8"?>
 <p:sld xmlns:a="http://schemas.openxmlformats.org/drawingml/2006/main" xmlns:r="http://schemas.openxmlformats.org/officeDocument/2006/relationships" xmlns:p="http://schemas.openxmlformats.org/presentationml/2006/main">
   <p:cSld>
     <p:spTree>
@@ -42211,10 +41851,17 @@
     <a:masterClrMapping/>
   </p:clrMapOvr>
   <p:transition spd="med"/>
+  <p:timing>
+    <p:tnLst>
+      <p:par>
+        <p:cTn id="1" dur="indefinite" restart="never" nodeType="tmRoot"/>
+      </p:par>
+    </p:tnLst>
+  </p:timing>
 </p:sld>
 </file>
 
-<file path=ppt/slides/slide48.xml><?xml version="1.0" encoding="utf-8"?>
+<file path=ppt/slides/slide47.xml><?xml version="1.0" encoding="utf-8"?>
 <p:sld xmlns:a="http://schemas.openxmlformats.org/drawingml/2006/main" xmlns:r="http://schemas.openxmlformats.org/officeDocument/2006/relationships" xmlns:p="http://schemas.openxmlformats.org/presentationml/2006/main">
   <p:cSld>
     <p:spTree>
@@ -42707,10 +42354,17 @@
     <a:masterClrMapping/>
   </p:clrMapOvr>
   <p:transition spd="med"/>
+  <p:timing>
+    <p:tnLst>
+      <p:par>
+        <p:cTn id="1" dur="indefinite" restart="never" nodeType="tmRoot"/>
+      </p:par>
+    </p:tnLst>
+  </p:timing>
 </p:sld>
 </file>
 
-<file path=ppt/slides/slide49.xml><?xml version="1.0" encoding="utf-8"?>
+<file path=ppt/slides/slide48.xml><?xml version="1.0" encoding="utf-8"?>
 <p:sld xmlns:a="http://schemas.openxmlformats.org/drawingml/2006/main" xmlns:r="http://schemas.openxmlformats.org/officeDocument/2006/relationships" xmlns:p="http://schemas.openxmlformats.org/presentationml/2006/main">
   <p:cSld>
     <p:spTree>
@@ -43203,6 +42857,634 @@
     <a:masterClrMapping/>
   </p:clrMapOvr>
   <p:transition spd="med"/>
+  <p:timing>
+    <p:tnLst>
+      <p:par>
+        <p:cTn id="1" dur="indefinite" restart="never" nodeType="tmRoot"/>
+      </p:par>
+    </p:tnLst>
+  </p:timing>
+</p:sld>
+</file>
+
+<file path=ppt/slides/slide49.xml><?xml version="1.0" encoding="utf-8"?>
+<p:sld xmlns:a="http://schemas.openxmlformats.org/drawingml/2006/main" xmlns:r="http://schemas.openxmlformats.org/officeDocument/2006/relationships" xmlns:p="http://schemas.openxmlformats.org/presentationml/2006/main">
+  <p:cSld>
+    <p:spTree>
+      <p:nvGrpSpPr>
+        <p:cNvPr id="1" name=""/>
+        <p:cNvGrpSpPr/>
+        <p:nvPr/>
+      </p:nvGrpSpPr>
+      <p:grpSpPr>
+        <a:xfrm>
+          <a:off x="0" y="0"/>
+          <a:ext cx="0" cy="0"/>
+          <a:chOff x="0" y="0"/>
+          <a:chExt cx="0" cy="0"/>
+        </a:xfrm>
+      </p:grpSpPr>
+      <p:pic>
+        <p:nvPicPr>
+          <p:cNvPr id="62465" name="Picture 1" descr="CMM_Logo.eps"/>
+          <p:cNvPicPr>
+            <a:picLocks noChangeAspect="1"/>
+          </p:cNvPicPr>
+          <p:nvPr/>
+        </p:nvPicPr>
+        <p:blipFill>
+          <a:blip r:embed="rId3">
+            <a:extLst>
+              <a:ext uri="{28A0092B-C50C-407E-A947-70E740481C1C}">
+                <a14:useLocalDpi xmlns:a14="http://schemas.microsoft.com/office/drawing/2010/main" val="0"/>
+              </a:ext>
+            </a:extLst>
+          </a:blip>
+          <a:srcRect/>
+          <a:stretch>
+            <a:fillRect/>
+          </a:stretch>
+        </p:blipFill>
+        <p:spPr bwMode="auto">
+          <a:xfrm>
+            <a:off x="457200" y="457200"/>
+            <a:ext cx="2590800" cy="428625"/>
+          </a:xfrm>
+          <a:prstGeom prst="rect">
+            <a:avLst/>
+          </a:prstGeom>
+          <a:noFill/>
+          <a:ln>
+            <a:noFill/>
+          </a:ln>
+          <a:effectLst/>
+          <a:extLst>
+            <a:ext uri="{909E8E84-426E-40DD-AFC4-6F175D3DCCD1}">
+              <a14:hiddenFill xmlns:a14="http://schemas.microsoft.com/office/drawing/2010/main">
+                <a:solidFill>
+                  <a:srgbClr val="FFFFFF"/>
+                </a:solidFill>
+              </a14:hiddenFill>
+            </a:ext>
+            <a:ext uri="{91240B29-F687-4F45-9708-019B960494DF}">
+              <a14:hiddenLine xmlns:a14="http://schemas.microsoft.com/office/drawing/2010/main" w="12700" cap="flat" cmpd="sng">
+                <a:solidFill>
+                  <a:srgbClr val="000000"/>
+                </a:solidFill>
+                <a:prstDash val="solid"/>
+                <a:miter lim="0"/>
+                <a:headEnd type="none" w="med" len="med"/>
+                <a:tailEnd type="none" w="med" len="med"/>
+              </a14:hiddenLine>
+            </a:ext>
+            <a:ext uri="{AF507438-7753-43E0-B8FC-AC1667EBCBE1}">
+              <a14:hiddenEffects xmlns:a14="http://schemas.microsoft.com/office/drawing/2010/main">
+                <a:effectLst>
+                  <a:outerShdw blurRad="63500" dist="38099" dir="2700000" algn="ctr" rotWithShape="0">
+                    <a:srgbClr val="000000">
+                      <a:alpha val="74998"/>
+                    </a:srgbClr>
+                  </a:outerShdw>
+                </a:effectLst>
+              </a14:hiddenEffects>
+            </a:ext>
+          </a:extLst>
+        </p:spPr>
+      </p:pic>
+      <p:sp>
+        <p:nvSpPr>
+          <p:cNvPr id="62466" name="Line 2"/>
+          <p:cNvSpPr>
+            <a:spLocks noChangeShapeType="1"/>
+          </p:cNvSpPr>
+          <p:nvPr/>
+        </p:nvSpPr>
+        <p:spPr bwMode="auto">
+          <a:xfrm>
+            <a:off x="3124200" y="685800"/>
+            <a:ext cx="5562600" cy="0"/>
+          </a:xfrm>
+          <a:prstGeom prst="line">
+            <a:avLst/>
+          </a:prstGeom>
+          <a:noFill/>
+          <a:ln w="25400" cap="flat" cmpd="sng">
+            <a:solidFill>
+              <a:srgbClr val="BFBFBF"/>
+            </a:solidFill>
+            <a:prstDash val="solid"/>
+            <a:round/>
+            <a:headEnd/>
+            <a:tailEnd/>
+          </a:ln>
+          <a:effectLst/>
+          <a:extLst>
+            <a:ext uri="{909E8E84-426E-40DD-AFC4-6F175D3DCCD1}">
+              <a14:hiddenFill xmlns:a14="http://schemas.microsoft.com/office/drawing/2010/main">
+                <a:noFill/>
+              </a14:hiddenFill>
+            </a:ext>
+            <a:ext uri="{AF507438-7753-43E0-B8FC-AC1667EBCBE1}">
+              <a14:hiddenEffects xmlns:a14="http://schemas.microsoft.com/office/drawing/2010/main">
+                <a:effectLst>
+                  <a:outerShdw blurRad="63500" dist="38099" dir="2700000" algn="ctr" rotWithShape="0">
+                    <a:srgbClr val="000000">
+                      <a:alpha val="74998"/>
+                    </a:srgbClr>
+                  </a:outerShdw>
+                </a:effectLst>
+              </a14:hiddenEffects>
+            </a:ext>
+          </a:extLst>
+        </p:spPr>
+        <p:txBody>
+          <a:bodyPr lIns="0" tIns="0" rIns="0" bIns="0"/>
+          <a:lstStyle/>
+          <a:p>
+            <a:endParaRPr lang="en-US" altLang="en-US" sz="1200">
+              <a:latin typeface="Helvetica" charset="0"/>
+              <a:ea typeface="Helvetica" charset="0"/>
+              <a:cs typeface="Helvetica" charset="0"/>
+              <a:sym typeface="Helvetica" charset="0"/>
+            </a:endParaRPr>
+          </a:p>
+        </p:txBody>
+      </p:sp>
+      <p:sp>
+        <p:nvSpPr>
+          <p:cNvPr id="62467" name="Line 3"/>
+          <p:cNvSpPr>
+            <a:spLocks noChangeShapeType="1"/>
+          </p:cNvSpPr>
+          <p:nvPr/>
+        </p:nvSpPr>
+        <p:spPr bwMode="auto">
+          <a:xfrm>
+            <a:off x="457200" y="6172200"/>
+            <a:ext cx="8229600" cy="0"/>
+          </a:xfrm>
+          <a:prstGeom prst="line">
+            <a:avLst/>
+          </a:prstGeom>
+          <a:noFill/>
+          <a:ln w="25400" cap="flat" cmpd="sng">
+            <a:solidFill>
+              <a:srgbClr val="BFBFBF"/>
+            </a:solidFill>
+            <a:prstDash val="solid"/>
+            <a:round/>
+            <a:headEnd/>
+            <a:tailEnd/>
+          </a:ln>
+          <a:effectLst/>
+          <a:extLst>
+            <a:ext uri="{909E8E84-426E-40DD-AFC4-6F175D3DCCD1}">
+              <a14:hiddenFill xmlns:a14="http://schemas.microsoft.com/office/drawing/2010/main">
+                <a:noFill/>
+              </a14:hiddenFill>
+            </a:ext>
+            <a:ext uri="{AF507438-7753-43E0-B8FC-AC1667EBCBE1}">
+              <a14:hiddenEffects xmlns:a14="http://schemas.microsoft.com/office/drawing/2010/main">
+                <a:effectLst>
+                  <a:outerShdw blurRad="63500" dist="38099" dir="2700000" algn="ctr" rotWithShape="0">
+                    <a:srgbClr val="000000">
+                      <a:alpha val="74998"/>
+                    </a:srgbClr>
+                  </a:outerShdw>
+                </a:effectLst>
+              </a14:hiddenEffects>
+            </a:ext>
+          </a:extLst>
+        </p:spPr>
+        <p:txBody>
+          <a:bodyPr lIns="0" tIns="0" rIns="0" bIns="0"/>
+          <a:lstStyle/>
+          <a:p>
+            <a:endParaRPr lang="en-US" altLang="en-US" sz="1200">
+              <a:latin typeface="Helvetica" charset="0"/>
+              <a:ea typeface="Helvetica" charset="0"/>
+              <a:cs typeface="Helvetica" charset="0"/>
+              <a:sym typeface="Helvetica" charset="0"/>
+            </a:endParaRPr>
+          </a:p>
+        </p:txBody>
+      </p:sp>
+      <p:sp>
+        <p:nvSpPr>
+          <p:cNvPr id="62468" name="AutoShape 4"/>
+          <p:cNvSpPr>
+            <a:spLocks/>
+          </p:cNvSpPr>
+          <p:nvPr/>
+        </p:nvSpPr>
+        <p:spPr bwMode="auto">
+          <a:xfrm>
+            <a:off x="5105400" y="685800"/>
+            <a:ext cx="3581400" cy="457200"/>
+          </a:xfrm>
+          <a:custGeom>
+            <a:avLst/>
+            <a:gdLst>
+              <a:gd name="T0" fmla="*/ 10800 w 21600"/>
+              <a:gd name="T1" fmla="*/ 10800 h 21600"/>
+              <a:gd name="T2" fmla="*/ 10800 w 21600"/>
+              <a:gd name="T3" fmla="*/ 10800 h 21600"/>
+              <a:gd name="T4" fmla="*/ 10800 w 21600"/>
+              <a:gd name="T5" fmla="*/ 10800 h 21600"/>
+              <a:gd name="T6" fmla="*/ 10800 w 21600"/>
+              <a:gd name="T7" fmla="*/ 10800 h 21600"/>
+            </a:gdLst>
+            <a:ahLst/>
+            <a:cxnLst>
+              <a:cxn ang="0">
+                <a:pos x="T0" y="T1"/>
+              </a:cxn>
+              <a:cxn ang="0">
+                <a:pos x="T2" y="T3"/>
+              </a:cxn>
+              <a:cxn ang="0">
+                <a:pos x="T4" y="T5"/>
+              </a:cxn>
+              <a:cxn ang="0">
+                <a:pos x="T6" y="T7"/>
+              </a:cxn>
+            </a:cxnLst>
+            <a:rect l="0" t="0" r="r" b="b"/>
+            <a:pathLst>
+              <a:path w="21600" h="21600">
+                <a:moveTo>
+                  <a:pt x="0" y="0"/>
+                </a:moveTo>
+                <a:lnTo>
+                  <a:pt x="21599" y="0"/>
+                </a:lnTo>
+                <a:lnTo>
+                  <a:pt x="21599" y="21600"/>
+                </a:lnTo>
+                <a:lnTo>
+                  <a:pt x="0" y="21600"/>
+                </a:lnTo>
+                <a:close/>
+              </a:path>
+            </a:pathLst>
+          </a:custGeom>
+          <a:solidFill>
+            <a:srgbClr val="BFBFBF"/>
+          </a:solidFill>
+          <a:ln>
+            <a:noFill/>
+          </a:ln>
+          <a:effectLst/>
+          <a:extLst>
+            <a:ext uri="{91240B29-F687-4F45-9708-019B960494DF}">
+              <a14:hiddenLine xmlns:a14="http://schemas.microsoft.com/office/drawing/2010/main" w="12700" cap="flat" cmpd="sng">
+                <a:solidFill>
+                  <a:srgbClr val="000000"/>
+                </a:solidFill>
+                <a:prstDash val="solid"/>
+                <a:miter lim="0"/>
+                <a:headEnd/>
+                <a:tailEnd/>
+              </a14:hiddenLine>
+            </a:ext>
+            <a:ext uri="{AF507438-7753-43E0-B8FC-AC1667EBCBE1}">
+              <a14:hiddenEffects xmlns:a14="http://schemas.microsoft.com/office/drawing/2010/main">
+                <a:effectLst>
+                  <a:outerShdw blurRad="63500" dist="38099" dir="2700000" algn="ctr" rotWithShape="0">
+                    <a:srgbClr val="000000">
+                      <a:alpha val="74998"/>
+                    </a:srgbClr>
+                  </a:outerShdw>
+                </a:effectLst>
+              </a14:hiddenEffects>
+            </a:ext>
+          </a:extLst>
+        </p:spPr>
+        <p:txBody>
+          <a:bodyPr lIns="0" tIns="0" rIns="0" bIns="0" anchor="ctr"/>
+          <a:lstStyle/>
+          <a:p>
+            <a:pPr algn="ctr"/>
+            <a:endParaRPr lang="en-US" altLang="en-US">
+              <a:solidFill>
+                <a:srgbClr val="FFFFFF"/>
+              </a:solidFill>
+            </a:endParaRPr>
+          </a:p>
+        </p:txBody>
+      </p:sp>
+      <p:sp>
+        <p:nvSpPr>
+          <p:cNvPr id="62469" name="AutoShape 5"/>
+          <p:cNvSpPr>
+            <a:spLocks/>
+          </p:cNvSpPr>
+          <p:nvPr/>
+        </p:nvSpPr>
+        <p:spPr bwMode="auto">
+          <a:xfrm>
+            <a:off x="5105400" y="788988"/>
+            <a:ext cx="3581400" cy="215900"/>
+          </a:xfrm>
+          <a:custGeom>
+            <a:avLst/>
+            <a:gdLst>
+              <a:gd name="T0" fmla="*/ 10800 w 21600"/>
+              <a:gd name="T1" fmla="*/ 10800 h 21600"/>
+              <a:gd name="T2" fmla="*/ 10800 w 21600"/>
+              <a:gd name="T3" fmla="*/ 10800 h 21600"/>
+              <a:gd name="T4" fmla="*/ 10800 w 21600"/>
+              <a:gd name="T5" fmla="*/ 10800 h 21600"/>
+              <a:gd name="T6" fmla="*/ 10800 w 21600"/>
+              <a:gd name="T7" fmla="*/ 10800 h 21600"/>
+            </a:gdLst>
+            <a:ahLst/>
+            <a:cxnLst>
+              <a:cxn ang="0">
+                <a:pos x="T0" y="T1"/>
+              </a:cxn>
+              <a:cxn ang="0">
+                <a:pos x="T2" y="T3"/>
+              </a:cxn>
+              <a:cxn ang="0">
+                <a:pos x="T4" y="T5"/>
+              </a:cxn>
+              <a:cxn ang="0">
+                <a:pos x="T6" y="T7"/>
+              </a:cxn>
+            </a:cxnLst>
+            <a:rect l="0" t="0" r="r" b="b"/>
+            <a:pathLst>
+              <a:path w="21600" h="21600">
+                <a:moveTo>
+                  <a:pt x="0" y="0"/>
+                </a:moveTo>
+                <a:lnTo>
+                  <a:pt x="21599" y="0"/>
+                </a:lnTo>
+                <a:lnTo>
+                  <a:pt x="21599" y="21600"/>
+                </a:lnTo>
+                <a:lnTo>
+                  <a:pt x="0" y="21600"/>
+                </a:lnTo>
+                <a:close/>
+              </a:path>
+            </a:pathLst>
+          </a:custGeom>
+          <a:noFill/>
+          <a:ln>
+            <a:noFill/>
+          </a:ln>
+          <a:effectLst/>
+          <a:extLst>
+            <a:ext uri="{909E8E84-426E-40DD-AFC4-6F175D3DCCD1}">
+              <a14:hiddenFill xmlns:a14="http://schemas.microsoft.com/office/drawing/2010/main">
+                <a:solidFill>
+                  <a:srgbClr val="FFFFFF"/>
+                </a:solidFill>
+              </a14:hiddenFill>
+            </a:ext>
+            <a:ext uri="{91240B29-F687-4F45-9708-019B960494DF}">
+              <a14:hiddenLine xmlns:a14="http://schemas.microsoft.com/office/drawing/2010/main" w="12700" cap="flat" cmpd="sng">
+                <a:solidFill>
+                  <a:srgbClr val="000000"/>
+                </a:solidFill>
+                <a:prstDash val="solid"/>
+                <a:miter lim="0"/>
+                <a:headEnd/>
+                <a:tailEnd/>
+              </a14:hiddenLine>
+            </a:ext>
+            <a:ext uri="{AF507438-7753-43E0-B8FC-AC1667EBCBE1}">
+              <a14:hiddenEffects xmlns:a14="http://schemas.microsoft.com/office/drawing/2010/main">
+                <a:effectLst>
+                  <a:outerShdw blurRad="63500" dist="38099" dir="2700000" algn="ctr" rotWithShape="0">
+                    <a:srgbClr val="000000">
+                      <a:alpha val="74998"/>
+                    </a:srgbClr>
+                  </a:outerShdw>
+                </a:effectLst>
+              </a14:hiddenEffects>
+            </a:ext>
+          </a:extLst>
+        </p:spPr>
+        <p:txBody>
+          <a:bodyPr lIns="0" tIns="0" rIns="0" bIns="0"/>
+          <a:lstStyle/>
+          <a:p>
+            <a:pPr algn="ctr"/>
+            <a:r>
+              <a:rPr lang="en-US" altLang="en-US" sz="1400">
+                <a:latin typeface="Verdana Bold" charset="0"/>
+                <a:ea typeface="Verdana Bold" charset="0"/>
+                <a:cs typeface="Verdana Bold" charset="0"/>
+                <a:sym typeface="Verdana Bold" charset="0"/>
+              </a:rPr>
+              <a:t>Applying the Rules – Passes Tests</a:t>
+            </a:r>
+            <a:endParaRPr lang="en-US" altLang="en-US"/>
+          </a:p>
+        </p:txBody>
+      </p:sp>
+      <p:pic>
+        <p:nvPicPr>
+          <p:cNvPr id="62470" name="Picture 6" descr="image23.png"/>
+          <p:cNvPicPr>
+            <a:picLocks noChangeAspect="1"/>
+          </p:cNvPicPr>
+          <p:nvPr/>
+        </p:nvPicPr>
+        <p:blipFill>
+          <a:blip r:embed="rId4">
+            <a:extLst>
+              <a:ext uri="{28A0092B-C50C-407E-A947-70E740481C1C}">
+                <a14:useLocalDpi xmlns:a14="http://schemas.microsoft.com/office/drawing/2010/main" val="0"/>
+              </a:ext>
+            </a:extLst>
+          </a:blip>
+          <a:srcRect/>
+          <a:stretch>
+            <a:fillRect/>
+          </a:stretch>
+        </p:blipFill>
+        <p:spPr bwMode="auto">
+          <a:xfrm>
+            <a:off x="914400" y="2090738"/>
+            <a:ext cx="7073900" cy="3962400"/>
+          </a:xfrm>
+          <a:prstGeom prst="rect">
+            <a:avLst/>
+          </a:prstGeom>
+          <a:noFill/>
+          <a:ln>
+            <a:noFill/>
+          </a:ln>
+          <a:effectLst/>
+          <a:extLst>
+            <a:ext uri="{909E8E84-426E-40DD-AFC4-6F175D3DCCD1}">
+              <a14:hiddenFill xmlns:a14="http://schemas.microsoft.com/office/drawing/2010/main">
+                <a:solidFill>
+                  <a:srgbClr val="FFFFFF"/>
+                </a:solidFill>
+              </a14:hiddenFill>
+            </a:ext>
+            <a:ext uri="{91240B29-F687-4F45-9708-019B960494DF}">
+              <a14:hiddenLine xmlns:a14="http://schemas.microsoft.com/office/drawing/2010/main" w="12700" cap="flat" cmpd="sng">
+                <a:solidFill>
+                  <a:srgbClr val="000000"/>
+                </a:solidFill>
+                <a:prstDash val="solid"/>
+                <a:miter lim="0"/>
+                <a:headEnd type="none" w="med" len="med"/>
+                <a:tailEnd type="none" w="med" len="med"/>
+              </a14:hiddenLine>
+            </a:ext>
+            <a:ext uri="{AF507438-7753-43E0-B8FC-AC1667EBCBE1}">
+              <a14:hiddenEffects xmlns:a14="http://schemas.microsoft.com/office/drawing/2010/main">
+                <a:effectLst>
+                  <a:outerShdw blurRad="63500" dist="38099" dir="2700000" algn="ctr" rotWithShape="0">
+                    <a:srgbClr val="000000">
+                      <a:alpha val="74998"/>
+                    </a:srgbClr>
+                  </a:outerShdw>
+                </a:effectLst>
+              </a14:hiddenEffects>
+            </a:ext>
+          </a:extLst>
+        </p:spPr>
+      </p:pic>
+      <p:sp>
+        <p:nvSpPr>
+          <p:cNvPr id="62471" name="AutoShape 7"/>
+          <p:cNvSpPr>
+            <a:spLocks/>
+          </p:cNvSpPr>
+          <p:nvPr/>
+        </p:nvSpPr>
+        <p:spPr bwMode="auto">
+          <a:xfrm>
+            <a:off x="458788" y="1230313"/>
+            <a:ext cx="7983537" cy="928687"/>
+          </a:xfrm>
+          <a:custGeom>
+            <a:avLst/>
+            <a:gdLst>
+              <a:gd name="T0" fmla="*/ 10800 w 21600"/>
+              <a:gd name="T1" fmla="*/ 10800 h 21600"/>
+              <a:gd name="T2" fmla="*/ 10800 w 21600"/>
+              <a:gd name="T3" fmla="*/ 10800 h 21600"/>
+              <a:gd name="T4" fmla="*/ 10800 w 21600"/>
+              <a:gd name="T5" fmla="*/ 10800 h 21600"/>
+              <a:gd name="T6" fmla="*/ 10800 w 21600"/>
+              <a:gd name="T7" fmla="*/ 10800 h 21600"/>
+            </a:gdLst>
+            <a:ahLst/>
+            <a:cxnLst>
+              <a:cxn ang="0">
+                <a:pos x="T0" y="T1"/>
+              </a:cxn>
+              <a:cxn ang="0">
+                <a:pos x="T2" y="T3"/>
+              </a:cxn>
+              <a:cxn ang="0">
+                <a:pos x="T4" y="T5"/>
+              </a:cxn>
+              <a:cxn ang="0">
+                <a:pos x="T6" y="T7"/>
+              </a:cxn>
+            </a:cxnLst>
+            <a:rect l="0" t="0" r="r" b="b"/>
+            <a:pathLst>
+              <a:path w="21600" h="21600">
+                <a:moveTo>
+                  <a:pt x="0" y="0"/>
+                </a:moveTo>
+                <a:lnTo>
+                  <a:pt x="21599" y="0"/>
+                </a:lnTo>
+                <a:lnTo>
+                  <a:pt x="21599" y="21600"/>
+                </a:lnTo>
+                <a:lnTo>
+                  <a:pt x="0" y="21600"/>
+                </a:lnTo>
+                <a:close/>
+              </a:path>
+            </a:pathLst>
+          </a:custGeom>
+          <a:noFill/>
+          <a:ln>
+            <a:noFill/>
+          </a:ln>
+          <a:effectLst/>
+          <a:extLst>
+            <a:ext uri="{909E8E84-426E-40DD-AFC4-6F175D3DCCD1}">
+              <a14:hiddenFill xmlns:a14="http://schemas.microsoft.com/office/drawing/2010/main">
+                <a:solidFill>
+                  <a:srgbClr val="FFFFFF"/>
+                </a:solidFill>
+              </a14:hiddenFill>
+            </a:ext>
+            <a:ext uri="{91240B29-F687-4F45-9708-019B960494DF}">
+              <a14:hiddenLine xmlns:a14="http://schemas.microsoft.com/office/drawing/2010/main" w="12700" cap="flat" cmpd="sng">
+                <a:solidFill>
+                  <a:srgbClr val="000000"/>
+                </a:solidFill>
+                <a:prstDash val="solid"/>
+                <a:miter lim="0"/>
+                <a:headEnd/>
+                <a:tailEnd/>
+              </a14:hiddenLine>
+            </a:ext>
+            <a:ext uri="{AF507438-7753-43E0-B8FC-AC1667EBCBE1}">
+              <a14:hiddenEffects xmlns:a14="http://schemas.microsoft.com/office/drawing/2010/main">
+                <a:effectLst>
+                  <a:outerShdw blurRad="63500" dist="38099" dir="2700000" algn="ctr" rotWithShape="0">
+                    <a:srgbClr val="000000">
+                      <a:alpha val="74998"/>
+                    </a:srgbClr>
+                  </a:outerShdw>
+                </a:effectLst>
+              </a14:hiddenEffects>
+            </a:ext>
+          </a:extLst>
+        </p:spPr>
+        <p:txBody>
+          <a:bodyPr lIns="45719" tIns="45719" rIns="45719" bIns="45719"/>
+          <a:lstStyle/>
+          <a:p>
+            <a:pPr algn="ctr"/>
+            <a:r>
+              <a:rPr lang="en-US" altLang="en-US" sz="5400">
+                <a:solidFill>
+                  <a:srgbClr val="F17F1B"/>
+                </a:solidFill>
+                <a:effectLst>
+                  <a:outerShdw blurRad="38100" dist="38100" dir="2700000" algn="tl">
+                    <a:srgbClr val="C0C0C0"/>
+                  </a:outerShdw>
+                </a:effectLst>
+              </a:rPr>
+              <a:t>Chasing the Implementation</a:t>
+            </a:r>
+            <a:endParaRPr lang="en-US" altLang="en-US"/>
+          </a:p>
+        </p:txBody>
+      </p:sp>
+    </p:spTree>
+  </p:cSld>
+  <p:clrMapOvr>
+    <a:masterClrMapping/>
+  </p:clrMapOvr>
+  <p:transition spd="med"/>
+  <p:timing>
+    <p:tnLst>
+      <p:par>
+        <p:cTn id="1" dur="indefinite" restart="never" nodeType="tmRoot"/>
+      </p:par>
+    </p:tnLst>
+  </p:timing>
 </p:sld>
 </file>
 
@@ -43412,7 +43694,7 @@
         <p:nvSpPr>
           <p:cNvPr id="11268" name="Rectangle 4"/>
           <p:cNvSpPr>
-            <a:spLocks noChangeArrowheads="1"/>
+            <a:spLocks noGrp="1" noChangeArrowheads="1"/>
           </p:cNvSpPr>
           <p:nvPr>
             <p:ph type="title"/>
@@ -43729,620 +44011,13 @@
     <a:masterClrMapping/>
   </p:clrMapOvr>
   <p:transition spd="med"/>
-</p:sld>
-</file>
-
-<file path=ppt/slides/slide50.xml><?xml version="1.0" encoding="utf-8"?>
-<p:sld xmlns:a="http://schemas.openxmlformats.org/drawingml/2006/main" xmlns:r="http://schemas.openxmlformats.org/officeDocument/2006/relationships" xmlns:p="http://schemas.openxmlformats.org/presentationml/2006/main">
-  <p:cSld>
-    <p:spTree>
-      <p:nvGrpSpPr>
-        <p:cNvPr id="1" name=""/>
-        <p:cNvGrpSpPr/>
-        <p:nvPr/>
-      </p:nvGrpSpPr>
-      <p:grpSpPr>
-        <a:xfrm>
-          <a:off x="0" y="0"/>
-          <a:ext cx="0" cy="0"/>
-          <a:chOff x="0" y="0"/>
-          <a:chExt cx="0" cy="0"/>
-        </a:xfrm>
-      </p:grpSpPr>
-      <p:pic>
-        <p:nvPicPr>
-          <p:cNvPr id="62465" name="Picture 1" descr="CMM_Logo.eps"/>
-          <p:cNvPicPr>
-            <a:picLocks noChangeAspect="1"/>
-          </p:cNvPicPr>
-          <p:nvPr/>
-        </p:nvPicPr>
-        <p:blipFill>
-          <a:blip r:embed="rId3">
-            <a:extLst>
-              <a:ext uri="{28A0092B-C50C-407E-A947-70E740481C1C}">
-                <a14:useLocalDpi xmlns:a14="http://schemas.microsoft.com/office/drawing/2010/main" val="0"/>
-              </a:ext>
-            </a:extLst>
-          </a:blip>
-          <a:srcRect/>
-          <a:stretch>
-            <a:fillRect/>
-          </a:stretch>
-        </p:blipFill>
-        <p:spPr bwMode="auto">
-          <a:xfrm>
-            <a:off x="457200" y="457200"/>
-            <a:ext cx="2590800" cy="428625"/>
-          </a:xfrm>
-          <a:prstGeom prst="rect">
-            <a:avLst/>
-          </a:prstGeom>
-          <a:noFill/>
-          <a:ln>
-            <a:noFill/>
-          </a:ln>
-          <a:effectLst/>
-          <a:extLst>
-            <a:ext uri="{909E8E84-426E-40DD-AFC4-6F175D3DCCD1}">
-              <a14:hiddenFill xmlns:a14="http://schemas.microsoft.com/office/drawing/2010/main">
-                <a:solidFill>
-                  <a:srgbClr val="FFFFFF"/>
-                </a:solidFill>
-              </a14:hiddenFill>
-            </a:ext>
-            <a:ext uri="{91240B29-F687-4F45-9708-019B960494DF}">
-              <a14:hiddenLine xmlns:a14="http://schemas.microsoft.com/office/drawing/2010/main" w="12700" cap="flat" cmpd="sng">
-                <a:solidFill>
-                  <a:srgbClr val="000000"/>
-                </a:solidFill>
-                <a:prstDash val="solid"/>
-                <a:miter lim="0"/>
-                <a:headEnd type="none" w="med" len="med"/>
-                <a:tailEnd type="none" w="med" len="med"/>
-              </a14:hiddenLine>
-            </a:ext>
-            <a:ext uri="{AF507438-7753-43E0-B8FC-AC1667EBCBE1}">
-              <a14:hiddenEffects xmlns:a14="http://schemas.microsoft.com/office/drawing/2010/main">
-                <a:effectLst>
-                  <a:outerShdw blurRad="63500" dist="38099" dir="2700000" algn="ctr" rotWithShape="0">
-                    <a:srgbClr val="000000">
-                      <a:alpha val="74998"/>
-                    </a:srgbClr>
-                  </a:outerShdw>
-                </a:effectLst>
-              </a14:hiddenEffects>
-            </a:ext>
-          </a:extLst>
-        </p:spPr>
-      </p:pic>
-      <p:sp>
-        <p:nvSpPr>
-          <p:cNvPr id="62466" name="Line 2"/>
-          <p:cNvSpPr>
-            <a:spLocks noChangeShapeType="1"/>
-          </p:cNvSpPr>
-          <p:nvPr/>
-        </p:nvSpPr>
-        <p:spPr bwMode="auto">
-          <a:xfrm>
-            <a:off x="3124200" y="685800"/>
-            <a:ext cx="5562600" cy="0"/>
-          </a:xfrm>
-          <a:prstGeom prst="line">
-            <a:avLst/>
-          </a:prstGeom>
-          <a:noFill/>
-          <a:ln w="25400" cap="flat" cmpd="sng">
-            <a:solidFill>
-              <a:srgbClr val="BFBFBF"/>
-            </a:solidFill>
-            <a:prstDash val="solid"/>
-            <a:round/>
-            <a:headEnd/>
-            <a:tailEnd/>
-          </a:ln>
-          <a:effectLst/>
-          <a:extLst>
-            <a:ext uri="{909E8E84-426E-40DD-AFC4-6F175D3DCCD1}">
-              <a14:hiddenFill xmlns:a14="http://schemas.microsoft.com/office/drawing/2010/main">
-                <a:noFill/>
-              </a14:hiddenFill>
-            </a:ext>
-            <a:ext uri="{AF507438-7753-43E0-B8FC-AC1667EBCBE1}">
-              <a14:hiddenEffects xmlns:a14="http://schemas.microsoft.com/office/drawing/2010/main">
-                <a:effectLst>
-                  <a:outerShdw blurRad="63500" dist="38099" dir="2700000" algn="ctr" rotWithShape="0">
-                    <a:srgbClr val="000000">
-                      <a:alpha val="74998"/>
-                    </a:srgbClr>
-                  </a:outerShdw>
-                </a:effectLst>
-              </a14:hiddenEffects>
-            </a:ext>
-          </a:extLst>
-        </p:spPr>
-        <p:txBody>
-          <a:bodyPr lIns="0" tIns="0" rIns="0" bIns="0"/>
-          <a:lstStyle/>
-          <a:p>
-            <a:endParaRPr lang="en-US" altLang="en-US" sz="1200">
-              <a:latin typeface="Helvetica" charset="0"/>
-              <a:ea typeface="Helvetica" charset="0"/>
-              <a:cs typeface="Helvetica" charset="0"/>
-              <a:sym typeface="Helvetica" charset="0"/>
-            </a:endParaRPr>
-          </a:p>
-        </p:txBody>
-      </p:sp>
-      <p:sp>
-        <p:nvSpPr>
-          <p:cNvPr id="62467" name="Line 3"/>
-          <p:cNvSpPr>
-            <a:spLocks noChangeShapeType="1"/>
-          </p:cNvSpPr>
-          <p:nvPr/>
-        </p:nvSpPr>
-        <p:spPr bwMode="auto">
-          <a:xfrm>
-            <a:off x="457200" y="6172200"/>
-            <a:ext cx="8229600" cy="0"/>
-          </a:xfrm>
-          <a:prstGeom prst="line">
-            <a:avLst/>
-          </a:prstGeom>
-          <a:noFill/>
-          <a:ln w="25400" cap="flat" cmpd="sng">
-            <a:solidFill>
-              <a:srgbClr val="BFBFBF"/>
-            </a:solidFill>
-            <a:prstDash val="solid"/>
-            <a:round/>
-            <a:headEnd/>
-            <a:tailEnd/>
-          </a:ln>
-          <a:effectLst/>
-          <a:extLst>
-            <a:ext uri="{909E8E84-426E-40DD-AFC4-6F175D3DCCD1}">
-              <a14:hiddenFill xmlns:a14="http://schemas.microsoft.com/office/drawing/2010/main">
-                <a:noFill/>
-              </a14:hiddenFill>
-            </a:ext>
-            <a:ext uri="{AF507438-7753-43E0-B8FC-AC1667EBCBE1}">
-              <a14:hiddenEffects xmlns:a14="http://schemas.microsoft.com/office/drawing/2010/main">
-                <a:effectLst>
-                  <a:outerShdw blurRad="63500" dist="38099" dir="2700000" algn="ctr" rotWithShape="0">
-                    <a:srgbClr val="000000">
-                      <a:alpha val="74998"/>
-                    </a:srgbClr>
-                  </a:outerShdw>
-                </a:effectLst>
-              </a14:hiddenEffects>
-            </a:ext>
-          </a:extLst>
-        </p:spPr>
-        <p:txBody>
-          <a:bodyPr lIns="0" tIns="0" rIns="0" bIns="0"/>
-          <a:lstStyle/>
-          <a:p>
-            <a:endParaRPr lang="en-US" altLang="en-US" sz="1200">
-              <a:latin typeface="Helvetica" charset="0"/>
-              <a:ea typeface="Helvetica" charset="0"/>
-              <a:cs typeface="Helvetica" charset="0"/>
-              <a:sym typeface="Helvetica" charset="0"/>
-            </a:endParaRPr>
-          </a:p>
-        </p:txBody>
-      </p:sp>
-      <p:sp>
-        <p:nvSpPr>
-          <p:cNvPr id="62468" name="AutoShape 4"/>
-          <p:cNvSpPr>
-            <a:spLocks/>
-          </p:cNvSpPr>
-          <p:nvPr/>
-        </p:nvSpPr>
-        <p:spPr bwMode="auto">
-          <a:xfrm>
-            <a:off x="5105400" y="685800"/>
-            <a:ext cx="3581400" cy="457200"/>
-          </a:xfrm>
-          <a:custGeom>
-            <a:avLst/>
-            <a:gdLst>
-              <a:gd name="T0" fmla="*/ 10800 w 21600"/>
-              <a:gd name="T1" fmla="*/ 10800 h 21600"/>
-              <a:gd name="T2" fmla="*/ 10800 w 21600"/>
-              <a:gd name="T3" fmla="*/ 10800 h 21600"/>
-              <a:gd name="T4" fmla="*/ 10800 w 21600"/>
-              <a:gd name="T5" fmla="*/ 10800 h 21600"/>
-              <a:gd name="T6" fmla="*/ 10800 w 21600"/>
-              <a:gd name="T7" fmla="*/ 10800 h 21600"/>
-            </a:gdLst>
-            <a:ahLst/>
-            <a:cxnLst>
-              <a:cxn ang="0">
-                <a:pos x="T0" y="T1"/>
-              </a:cxn>
-              <a:cxn ang="0">
-                <a:pos x="T2" y="T3"/>
-              </a:cxn>
-              <a:cxn ang="0">
-                <a:pos x="T4" y="T5"/>
-              </a:cxn>
-              <a:cxn ang="0">
-                <a:pos x="T6" y="T7"/>
-              </a:cxn>
-            </a:cxnLst>
-            <a:rect l="0" t="0" r="r" b="b"/>
-            <a:pathLst>
-              <a:path w="21600" h="21600">
-                <a:moveTo>
-                  <a:pt x="0" y="0"/>
-                </a:moveTo>
-                <a:lnTo>
-                  <a:pt x="21599" y="0"/>
-                </a:lnTo>
-                <a:lnTo>
-                  <a:pt x="21599" y="21600"/>
-                </a:lnTo>
-                <a:lnTo>
-                  <a:pt x="0" y="21600"/>
-                </a:lnTo>
-                <a:close/>
-              </a:path>
-            </a:pathLst>
-          </a:custGeom>
-          <a:solidFill>
-            <a:srgbClr val="BFBFBF"/>
-          </a:solidFill>
-          <a:ln>
-            <a:noFill/>
-          </a:ln>
-          <a:effectLst/>
-          <a:extLst>
-            <a:ext uri="{91240B29-F687-4F45-9708-019B960494DF}">
-              <a14:hiddenLine xmlns:a14="http://schemas.microsoft.com/office/drawing/2010/main" w="12700" cap="flat" cmpd="sng">
-                <a:solidFill>
-                  <a:srgbClr val="000000"/>
-                </a:solidFill>
-                <a:prstDash val="solid"/>
-                <a:miter lim="0"/>
-                <a:headEnd/>
-                <a:tailEnd/>
-              </a14:hiddenLine>
-            </a:ext>
-            <a:ext uri="{AF507438-7753-43E0-B8FC-AC1667EBCBE1}">
-              <a14:hiddenEffects xmlns:a14="http://schemas.microsoft.com/office/drawing/2010/main">
-                <a:effectLst>
-                  <a:outerShdw blurRad="63500" dist="38099" dir="2700000" algn="ctr" rotWithShape="0">
-                    <a:srgbClr val="000000">
-                      <a:alpha val="74998"/>
-                    </a:srgbClr>
-                  </a:outerShdw>
-                </a:effectLst>
-              </a14:hiddenEffects>
-            </a:ext>
-          </a:extLst>
-        </p:spPr>
-        <p:txBody>
-          <a:bodyPr lIns="0" tIns="0" rIns="0" bIns="0" anchor="ctr"/>
-          <a:lstStyle/>
-          <a:p>
-            <a:pPr algn="ctr"/>
-            <a:endParaRPr lang="en-US" altLang="en-US">
-              <a:solidFill>
-                <a:srgbClr val="FFFFFF"/>
-              </a:solidFill>
-            </a:endParaRPr>
-          </a:p>
-        </p:txBody>
-      </p:sp>
-      <p:sp>
-        <p:nvSpPr>
-          <p:cNvPr id="62469" name="AutoShape 5"/>
-          <p:cNvSpPr>
-            <a:spLocks/>
-          </p:cNvSpPr>
-          <p:nvPr/>
-        </p:nvSpPr>
-        <p:spPr bwMode="auto">
-          <a:xfrm>
-            <a:off x="5105400" y="788988"/>
-            <a:ext cx="3581400" cy="215900"/>
-          </a:xfrm>
-          <a:custGeom>
-            <a:avLst/>
-            <a:gdLst>
-              <a:gd name="T0" fmla="*/ 10800 w 21600"/>
-              <a:gd name="T1" fmla="*/ 10800 h 21600"/>
-              <a:gd name="T2" fmla="*/ 10800 w 21600"/>
-              <a:gd name="T3" fmla="*/ 10800 h 21600"/>
-              <a:gd name="T4" fmla="*/ 10800 w 21600"/>
-              <a:gd name="T5" fmla="*/ 10800 h 21600"/>
-              <a:gd name="T6" fmla="*/ 10800 w 21600"/>
-              <a:gd name="T7" fmla="*/ 10800 h 21600"/>
-            </a:gdLst>
-            <a:ahLst/>
-            <a:cxnLst>
-              <a:cxn ang="0">
-                <a:pos x="T0" y="T1"/>
-              </a:cxn>
-              <a:cxn ang="0">
-                <a:pos x="T2" y="T3"/>
-              </a:cxn>
-              <a:cxn ang="0">
-                <a:pos x="T4" y="T5"/>
-              </a:cxn>
-              <a:cxn ang="0">
-                <a:pos x="T6" y="T7"/>
-              </a:cxn>
-            </a:cxnLst>
-            <a:rect l="0" t="0" r="r" b="b"/>
-            <a:pathLst>
-              <a:path w="21600" h="21600">
-                <a:moveTo>
-                  <a:pt x="0" y="0"/>
-                </a:moveTo>
-                <a:lnTo>
-                  <a:pt x="21599" y="0"/>
-                </a:lnTo>
-                <a:lnTo>
-                  <a:pt x="21599" y="21600"/>
-                </a:lnTo>
-                <a:lnTo>
-                  <a:pt x="0" y="21600"/>
-                </a:lnTo>
-                <a:close/>
-              </a:path>
-            </a:pathLst>
-          </a:custGeom>
-          <a:noFill/>
-          <a:ln>
-            <a:noFill/>
-          </a:ln>
-          <a:effectLst/>
-          <a:extLst>
-            <a:ext uri="{909E8E84-426E-40DD-AFC4-6F175D3DCCD1}">
-              <a14:hiddenFill xmlns:a14="http://schemas.microsoft.com/office/drawing/2010/main">
-                <a:solidFill>
-                  <a:srgbClr val="FFFFFF"/>
-                </a:solidFill>
-              </a14:hiddenFill>
-            </a:ext>
-            <a:ext uri="{91240B29-F687-4F45-9708-019B960494DF}">
-              <a14:hiddenLine xmlns:a14="http://schemas.microsoft.com/office/drawing/2010/main" w="12700" cap="flat" cmpd="sng">
-                <a:solidFill>
-                  <a:srgbClr val="000000"/>
-                </a:solidFill>
-                <a:prstDash val="solid"/>
-                <a:miter lim="0"/>
-                <a:headEnd/>
-                <a:tailEnd/>
-              </a14:hiddenLine>
-            </a:ext>
-            <a:ext uri="{AF507438-7753-43E0-B8FC-AC1667EBCBE1}">
-              <a14:hiddenEffects xmlns:a14="http://schemas.microsoft.com/office/drawing/2010/main">
-                <a:effectLst>
-                  <a:outerShdw blurRad="63500" dist="38099" dir="2700000" algn="ctr" rotWithShape="0">
-                    <a:srgbClr val="000000">
-                      <a:alpha val="74998"/>
-                    </a:srgbClr>
-                  </a:outerShdw>
-                </a:effectLst>
-              </a14:hiddenEffects>
-            </a:ext>
-          </a:extLst>
-        </p:spPr>
-        <p:txBody>
-          <a:bodyPr lIns="0" tIns="0" rIns="0" bIns="0"/>
-          <a:lstStyle/>
-          <a:p>
-            <a:pPr algn="ctr"/>
-            <a:r>
-              <a:rPr lang="en-US" altLang="en-US" sz="1400">
-                <a:latin typeface="Verdana Bold" charset="0"/>
-                <a:ea typeface="Verdana Bold" charset="0"/>
-                <a:cs typeface="Verdana Bold" charset="0"/>
-                <a:sym typeface="Verdana Bold" charset="0"/>
-              </a:rPr>
-              <a:t>Applying the Rules – Passes Tests</a:t>
-            </a:r>
-            <a:endParaRPr lang="en-US" altLang="en-US"/>
-          </a:p>
-        </p:txBody>
-      </p:sp>
-      <p:pic>
-        <p:nvPicPr>
-          <p:cNvPr id="62470" name="Picture 6" descr="image23.png"/>
-          <p:cNvPicPr>
-            <a:picLocks noChangeAspect="1"/>
-          </p:cNvPicPr>
-          <p:nvPr/>
-        </p:nvPicPr>
-        <p:blipFill>
-          <a:blip r:embed="rId4">
-            <a:extLst>
-              <a:ext uri="{28A0092B-C50C-407E-A947-70E740481C1C}">
-                <a14:useLocalDpi xmlns:a14="http://schemas.microsoft.com/office/drawing/2010/main" val="0"/>
-              </a:ext>
-            </a:extLst>
-          </a:blip>
-          <a:srcRect/>
-          <a:stretch>
-            <a:fillRect/>
-          </a:stretch>
-        </p:blipFill>
-        <p:spPr bwMode="auto">
-          <a:xfrm>
-            <a:off x="914400" y="2090738"/>
-            <a:ext cx="7073900" cy="3962400"/>
-          </a:xfrm>
-          <a:prstGeom prst="rect">
-            <a:avLst/>
-          </a:prstGeom>
-          <a:noFill/>
-          <a:ln>
-            <a:noFill/>
-          </a:ln>
-          <a:effectLst/>
-          <a:extLst>
-            <a:ext uri="{909E8E84-426E-40DD-AFC4-6F175D3DCCD1}">
-              <a14:hiddenFill xmlns:a14="http://schemas.microsoft.com/office/drawing/2010/main">
-                <a:solidFill>
-                  <a:srgbClr val="FFFFFF"/>
-                </a:solidFill>
-              </a14:hiddenFill>
-            </a:ext>
-            <a:ext uri="{91240B29-F687-4F45-9708-019B960494DF}">
-              <a14:hiddenLine xmlns:a14="http://schemas.microsoft.com/office/drawing/2010/main" w="12700" cap="flat" cmpd="sng">
-                <a:solidFill>
-                  <a:srgbClr val="000000"/>
-                </a:solidFill>
-                <a:prstDash val="solid"/>
-                <a:miter lim="0"/>
-                <a:headEnd type="none" w="med" len="med"/>
-                <a:tailEnd type="none" w="med" len="med"/>
-              </a14:hiddenLine>
-            </a:ext>
-            <a:ext uri="{AF507438-7753-43E0-B8FC-AC1667EBCBE1}">
-              <a14:hiddenEffects xmlns:a14="http://schemas.microsoft.com/office/drawing/2010/main">
-                <a:effectLst>
-                  <a:outerShdw blurRad="63500" dist="38099" dir="2700000" algn="ctr" rotWithShape="0">
-                    <a:srgbClr val="000000">
-                      <a:alpha val="74998"/>
-                    </a:srgbClr>
-                  </a:outerShdw>
-                </a:effectLst>
-              </a14:hiddenEffects>
-            </a:ext>
-          </a:extLst>
-        </p:spPr>
-      </p:pic>
-      <p:sp>
-        <p:nvSpPr>
-          <p:cNvPr id="62471" name="AutoShape 7"/>
-          <p:cNvSpPr>
-            <a:spLocks/>
-          </p:cNvSpPr>
-          <p:nvPr/>
-        </p:nvSpPr>
-        <p:spPr bwMode="auto">
-          <a:xfrm>
-            <a:off x="458788" y="1230313"/>
-            <a:ext cx="7983537" cy="928687"/>
-          </a:xfrm>
-          <a:custGeom>
-            <a:avLst/>
-            <a:gdLst>
-              <a:gd name="T0" fmla="*/ 10800 w 21600"/>
-              <a:gd name="T1" fmla="*/ 10800 h 21600"/>
-              <a:gd name="T2" fmla="*/ 10800 w 21600"/>
-              <a:gd name="T3" fmla="*/ 10800 h 21600"/>
-              <a:gd name="T4" fmla="*/ 10800 w 21600"/>
-              <a:gd name="T5" fmla="*/ 10800 h 21600"/>
-              <a:gd name="T6" fmla="*/ 10800 w 21600"/>
-              <a:gd name="T7" fmla="*/ 10800 h 21600"/>
-            </a:gdLst>
-            <a:ahLst/>
-            <a:cxnLst>
-              <a:cxn ang="0">
-                <a:pos x="T0" y="T1"/>
-              </a:cxn>
-              <a:cxn ang="0">
-                <a:pos x="T2" y="T3"/>
-              </a:cxn>
-              <a:cxn ang="0">
-                <a:pos x="T4" y="T5"/>
-              </a:cxn>
-              <a:cxn ang="0">
-                <a:pos x="T6" y="T7"/>
-              </a:cxn>
-            </a:cxnLst>
-            <a:rect l="0" t="0" r="r" b="b"/>
-            <a:pathLst>
-              <a:path w="21600" h="21600">
-                <a:moveTo>
-                  <a:pt x="0" y="0"/>
-                </a:moveTo>
-                <a:lnTo>
-                  <a:pt x="21599" y="0"/>
-                </a:lnTo>
-                <a:lnTo>
-                  <a:pt x="21599" y="21600"/>
-                </a:lnTo>
-                <a:lnTo>
-                  <a:pt x="0" y="21600"/>
-                </a:lnTo>
-                <a:close/>
-              </a:path>
-            </a:pathLst>
-          </a:custGeom>
-          <a:noFill/>
-          <a:ln>
-            <a:noFill/>
-          </a:ln>
-          <a:effectLst/>
-          <a:extLst>
-            <a:ext uri="{909E8E84-426E-40DD-AFC4-6F175D3DCCD1}">
-              <a14:hiddenFill xmlns:a14="http://schemas.microsoft.com/office/drawing/2010/main">
-                <a:solidFill>
-                  <a:srgbClr val="FFFFFF"/>
-                </a:solidFill>
-              </a14:hiddenFill>
-            </a:ext>
-            <a:ext uri="{91240B29-F687-4F45-9708-019B960494DF}">
-              <a14:hiddenLine xmlns:a14="http://schemas.microsoft.com/office/drawing/2010/main" w="12700" cap="flat" cmpd="sng">
-                <a:solidFill>
-                  <a:srgbClr val="000000"/>
-                </a:solidFill>
-                <a:prstDash val="solid"/>
-                <a:miter lim="0"/>
-                <a:headEnd/>
-                <a:tailEnd/>
-              </a14:hiddenLine>
-            </a:ext>
-            <a:ext uri="{AF507438-7753-43E0-B8FC-AC1667EBCBE1}">
-              <a14:hiddenEffects xmlns:a14="http://schemas.microsoft.com/office/drawing/2010/main">
-                <a:effectLst>
-                  <a:outerShdw blurRad="63500" dist="38099" dir="2700000" algn="ctr" rotWithShape="0">
-                    <a:srgbClr val="000000">
-                      <a:alpha val="74998"/>
-                    </a:srgbClr>
-                  </a:outerShdw>
-                </a:effectLst>
-              </a14:hiddenEffects>
-            </a:ext>
-          </a:extLst>
-        </p:spPr>
-        <p:txBody>
-          <a:bodyPr lIns="45719" tIns="45719" rIns="45719" bIns="45719"/>
-          <a:lstStyle/>
-          <a:p>
-            <a:pPr algn="ctr"/>
-            <a:r>
-              <a:rPr lang="en-US" altLang="en-US" sz="5400">
-                <a:solidFill>
-                  <a:srgbClr val="F17F1B"/>
-                </a:solidFill>
-                <a:effectLst>
-                  <a:outerShdw blurRad="38100" dist="38100" dir="2700000" algn="tl">
-                    <a:srgbClr val="C0C0C0"/>
-                  </a:outerShdw>
-                </a:effectLst>
-              </a:rPr>
-              <a:t>Chasing the Implementation</a:t>
-            </a:r>
-            <a:endParaRPr lang="en-US" altLang="en-US"/>
-          </a:p>
-        </p:txBody>
-      </p:sp>
-    </p:spTree>
-  </p:cSld>
-  <p:clrMapOvr>
-    <a:masterClrMapping/>
-  </p:clrMapOvr>
-  <p:transition spd="med"/>
+  <p:timing>
+    <p:tnLst>
+      <p:par>
+        <p:cTn id="1" dur="indefinite" restart="never" nodeType="tmRoot"/>
+      </p:par>
+    </p:tnLst>
+  </p:timing>
 </p:sld>
 </file>
 
@@ -44839,6 +44514,13 @@
     <a:masterClrMapping/>
   </p:clrMapOvr>
   <p:transition spd="med"/>
+  <p:timing>
+    <p:tnLst>
+      <p:par>
+        <p:cTn id="1" dur="indefinite" restart="never" nodeType="tmRoot"/>
+      </p:par>
+    </p:tnLst>
+  </p:timing>
 </p:sld>
 </file>
 
@@ -45335,6 +45017,13 @@
     <a:masterClrMapping/>
   </p:clrMapOvr>
   <p:transition spd="med"/>
+  <p:timing>
+    <p:tnLst>
+      <p:par>
+        <p:cTn id="1" dur="indefinite" restart="never" nodeType="tmRoot"/>
+      </p:par>
+    </p:tnLst>
+  </p:timing>
 </p:sld>
 </file>
 
@@ -45938,6 +45627,13 @@
     <a:masterClrMapping/>
   </p:clrMapOvr>
   <p:transition spd="med"/>
+  <p:timing>
+    <p:tnLst>
+      <p:par>
+        <p:cTn id="1" dur="indefinite" restart="never" nodeType="tmRoot"/>
+      </p:par>
+    </p:tnLst>
+  </p:timing>
 </p:sld>
 </file>
 
@@ -46147,7 +45843,7 @@
         <p:nvSpPr>
           <p:cNvPr id="17412" name="Rectangle 4"/>
           <p:cNvSpPr>
-            <a:spLocks noChangeArrowheads="1"/>
+            <a:spLocks noGrp="1" noChangeArrowheads="1"/>
           </p:cNvSpPr>
           <p:nvPr>
             <p:ph type="title"/>
@@ -46453,6 +46149,13 @@
     <a:masterClrMapping/>
   </p:clrMapOvr>
   <p:transition spd="med"/>
+  <p:timing>
+    <p:tnLst>
+      <p:par>
+        <p:cTn id="1" dur="indefinite" restart="never" nodeType="tmRoot"/>
+      </p:par>
+    </p:tnLst>
+  </p:timing>
 </p:sld>
 </file>
 

</xml_diff>